<commit_message>
FINAL caesar cipher presentation
</commit_message>
<xml_diff>
--- a/CaesarCipher_CIS113_DW.pptx
+++ b/CaesarCipher_CIS113_DW.pptx
@@ -7,14 +7,15 @@
   <p:sldIdLst>
     <p:sldId id="256" r:id="rId2"/>
     <p:sldId id="259" r:id="rId3"/>
-    <p:sldId id="260" r:id="rId4"/>
-    <p:sldId id="258" r:id="rId5"/>
-    <p:sldId id="257" r:id="rId6"/>
-    <p:sldId id="261" r:id="rId7"/>
-    <p:sldId id="262" r:id="rId8"/>
-    <p:sldId id="263" r:id="rId9"/>
-    <p:sldId id="264" r:id="rId10"/>
-    <p:sldId id="265" r:id="rId11"/>
+    <p:sldId id="266" r:id="rId4"/>
+    <p:sldId id="260" r:id="rId5"/>
+    <p:sldId id="258" r:id="rId6"/>
+    <p:sldId id="257" r:id="rId7"/>
+    <p:sldId id="261" r:id="rId8"/>
+    <p:sldId id="262" r:id="rId9"/>
+    <p:sldId id="263" r:id="rId10"/>
+    <p:sldId id="264" r:id="rId11"/>
+    <p:sldId id="265" r:id="rId12"/>
   </p:sldIdLst>
   <p:sldSz cx="12192000" cy="6858000"/>
   <p:notesSz cx="6858000" cy="9144000"/>
@@ -114,14 +115,6 @@
     </a:lvl9pPr>
   </p:defaultTextStyle>
 </p:presentation>
-</file>
-
-<file path=ppt/revisionInfo.xml><?xml version="1.0" encoding="utf-8"?>
-<p1510:revInfo xmlns:a="http://schemas.openxmlformats.org/drawingml/2006/main" xmlns:r="http://schemas.openxmlformats.org/officeDocument/2006/relationships" xmlns:p1510="http://schemas.microsoft.com/office/powerpoint/2015/10/main">
-  <p1510:revLst>
-    <p1510:client id="{993B6802-FF79-46AC-BF18-74ED6F765B45}" v="901" dt="2018-10-04T05:21:58.685"/>
-  </p1510:revLst>
-</p1510:revInfo>
 </file>
 
 <file path=ppt/diagrams/colors1.xml><?xml version="1.0" encoding="utf-8"?>
@@ -8580,6 +8573,135 @@
           <p:cNvPr id="2" name="Title 1">
             <a:extLst>
               <a:ext uri="{FF2B5EF4-FFF2-40B4-BE49-F238E27FC236}">
+                <a16:creationId xmlns:a16="http://schemas.microsoft.com/office/drawing/2014/main" id="{8319EC3C-0EDE-42E7-B279-4F8B4475E1CF}"/>
+              </a:ext>
+            </a:extLst>
+          </p:cNvPr>
+          <p:cNvSpPr>
+            <a:spLocks noGrp="1"/>
+          </p:cNvSpPr>
+          <p:nvPr>
+            <p:ph type="title"/>
+          </p:nvPr>
+        </p:nvSpPr>
+        <p:spPr>
+          <a:xfrm>
+            <a:off x="1030287" y="635726"/>
+            <a:ext cx="10131425" cy="1456267"/>
+          </a:xfrm>
+        </p:spPr>
+        <p:txBody>
+          <a:bodyPr/>
+          <a:lstStyle/>
+          <a:p>
+            <a:pPr algn="ctr"/>
+            <a:r>
+              <a:rPr lang="en-US" dirty="0"/>
+              <a:t>Caesar cipher</a:t>
+            </a:r>
+          </a:p>
+        </p:txBody>
+      </p:sp>
+      <p:sp>
+        <p:nvSpPr>
+          <p:cNvPr id="6" name="TextBox 5">
+            <a:extLst>
+              <a:ext uri="{FF2B5EF4-FFF2-40B4-BE49-F238E27FC236}">
+                <a16:creationId xmlns:a16="http://schemas.microsoft.com/office/drawing/2014/main" id="{67F9E4E2-F0EF-47ED-A7E6-EEE76285E3FB}"/>
+              </a:ext>
+            </a:extLst>
+          </p:cNvPr>
+          <p:cNvSpPr txBox="1"/>
+          <p:nvPr/>
+        </p:nvSpPr>
+        <p:spPr>
+          <a:xfrm>
+            <a:off x="1293222" y="2091993"/>
+            <a:ext cx="9605554" cy="523220"/>
+          </a:xfrm>
+          <a:prstGeom prst="rect">
+            <a:avLst/>
+          </a:prstGeom>
+          <a:noFill/>
+        </p:spPr>
+        <p:txBody>
+          <a:bodyPr wrap="square" rtlCol="0">
+            <a:spAutoFit/>
+          </a:bodyPr>
+          <a:lstStyle/>
+          <a:p>
+            <a:pPr algn="ctr"/>
+            <a:r>
+              <a:rPr lang="en-US" sz="2800" dirty="0"/>
+              <a:t>Final result with letter shift of five (5).</a:t>
+            </a:r>
+          </a:p>
+        </p:txBody>
+      </p:sp>
+      <p:pic>
+        <p:nvPicPr>
+          <p:cNvPr id="10" name="Content Placeholder 9">
+            <a:extLst>
+              <a:ext uri="{FF2B5EF4-FFF2-40B4-BE49-F238E27FC236}">
+                <a16:creationId xmlns:a16="http://schemas.microsoft.com/office/drawing/2014/main" id="{BF3075F7-927F-4B61-9A0D-7CF3DF11BE86}"/>
+              </a:ext>
+            </a:extLst>
+          </p:cNvPr>
+          <p:cNvPicPr>
+            <a:picLocks noGrp="1" noChangeAspect="1"/>
+          </p:cNvPicPr>
+          <p:nvPr>
+            <p:ph idx="1"/>
+          </p:nvPr>
+        </p:nvPicPr>
+        <p:blipFill>
+          <a:blip r:embed="rId2"/>
+          <a:stretch>
+            <a:fillRect/>
+          </a:stretch>
+        </p:blipFill>
+        <p:spPr>
+          <a:xfrm>
+            <a:off x="183312" y="2858403"/>
+            <a:ext cx="11825374" cy="2662832"/>
+          </a:xfrm>
+        </p:spPr>
+      </p:pic>
+    </p:spTree>
+    <p:extLst>
+      <p:ext uri="{BB962C8B-B14F-4D97-AF65-F5344CB8AC3E}">
+        <p14:creationId xmlns:p14="http://schemas.microsoft.com/office/powerpoint/2010/main" val="2119457388"/>
+      </p:ext>
+    </p:extLst>
+  </p:cSld>
+  <p:clrMapOvr>
+    <a:masterClrMapping/>
+  </p:clrMapOvr>
+</p:sld>
+</file>
+
+<file path=ppt/slides/slide11.xml><?xml version="1.0" encoding="utf-8"?>
+<p:sld xmlns:a="http://schemas.openxmlformats.org/drawingml/2006/main" xmlns:r="http://schemas.openxmlformats.org/officeDocument/2006/relationships" xmlns:p="http://schemas.openxmlformats.org/presentationml/2006/main">
+  <p:cSld>
+    <p:spTree>
+      <p:nvGrpSpPr>
+        <p:cNvPr id="1" name=""/>
+        <p:cNvGrpSpPr/>
+        <p:nvPr/>
+      </p:nvGrpSpPr>
+      <p:grpSpPr>
+        <a:xfrm>
+          <a:off x="0" y="0"/>
+          <a:ext cx="0" cy="0"/>
+          <a:chOff x="0" y="0"/>
+          <a:chExt cx="0" cy="0"/>
+        </a:xfrm>
+      </p:grpSpPr>
+      <p:sp>
+        <p:nvSpPr>
+          <p:cNvPr id="2" name="Title 1">
+            <a:extLst>
+              <a:ext uri="{FF2B5EF4-FFF2-40B4-BE49-F238E27FC236}">
                 <a16:creationId xmlns:a16="http://schemas.microsoft.com/office/drawing/2014/main" id="{F7F8F481-A898-408E-AF04-54EC8A03D37E}"/>
               </a:ext>
             </a:extLst>
@@ -8628,15 +8750,36 @@
           <a:lstStyle/>
           <a:p>
             <a:r>
+              <a:rPr lang="en-US" sz="3600"/>
+              <a:t>All </a:t>
+            </a:r>
+            <a:r>
               <a:rPr lang="en-US" sz="3600" dirty="0"/>
-              <a:t>Our program will allow input any character, number, letter or special character without breaking, and will populate the list with only letters.</a:t>
-            </a:r>
-          </a:p>
-          <a:p>
-            <a:r>
-              <a:rPr lang="en-US" sz="3600" dirty="0"/>
-              <a:t>All non-letters are replaced with whitespace.</a:t>
-            </a:r>
+              <a:t>non-letters are replaced with whitespace through a regex expression below.</a:t>
+            </a:r>
+          </a:p>
+          <a:p>
+            <a:r>
+              <a:rPr lang="en-US" sz="3200" b="1" dirty="0"/>
+              <a:t>String str = </a:t>
+            </a:r>
+            <a:r>
+              <a:rPr lang="en-US" sz="3200" b="1" i="1" dirty="0" err="1"/>
+              <a:t>text.replaceAll</a:t>
+            </a:r>
+            <a:r>
+              <a:rPr lang="en-US" sz="3200" b="1" i="1" dirty="0"/>
+              <a:t>("[^\\p{</a:t>
+            </a:r>
+            <a:r>
+              <a:rPr lang="en-US" sz="3200" b="1" i="1" dirty="0" err="1"/>
+              <a:t>Alnum</a:t>
+            </a:r>
+            <a:r>
+              <a:rPr lang="en-US" sz="3200" b="1" i="1" dirty="0"/>
+              <a:t>}]+", " ");</a:t>
+            </a:r>
+            <a:endParaRPr lang="en-US" sz="3200" dirty="0"/>
           </a:p>
         </p:txBody>
       </p:sp>
@@ -8747,6 +8890,113 @@
 </file>
 
 <file path=ppt/slides/slide3.xml><?xml version="1.0" encoding="utf-8"?>
+<p:sld xmlns:a="http://schemas.openxmlformats.org/drawingml/2006/main" xmlns:r="http://schemas.openxmlformats.org/officeDocument/2006/relationships" xmlns:p="http://schemas.openxmlformats.org/presentationml/2006/main">
+  <p:cSld>
+    <p:spTree>
+      <p:nvGrpSpPr>
+        <p:cNvPr id="1" name=""/>
+        <p:cNvGrpSpPr/>
+        <p:nvPr/>
+      </p:nvGrpSpPr>
+      <p:grpSpPr>
+        <a:xfrm>
+          <a:off x="0" y="0"/>
+          <a:ext cx="0" cy="0"/>
+          <a:chOff x="0" y="0"/>
+          <a:chExt cx="0" cy="0"/>
+        </a:xfrm>
+      </p:grpSpPr>
+      <p:sp>
+        <p:nvSpPr>
+          <p:cNvPr id="2" name="Title 1">
+            <a:extLst>
+              <a:ext uri="{FF2B5EF4-FFF2-40B4-BE49-F238E27FC236}">
+                <a16:creationId xmlns:a16="http://schemas.microsoft.com/office/drawing/2014/main" id="{178072B4-2BEB-4869-9BAF-9CEE70941B10}"/>
+              </a:ext>
+            </a:extLst>
+          </p:cNvPr>
+          <p:cNvSpPr>
+            <a:spLocks noGrp="1"/>
+          </p:cNvSpPr>
+          <p:nvPr>
+            <p:ph type="title"/>
+          </p:nvPr>
+        </p:nvSpPr>
+        <p:spPr/>
+        <p:txBody>
+          <a:bodyPr/>
+          <a:lstStyle/>
+          <a:p>
+            <a:pPr algn="ctr"/>
+            <a:r>
+              <a:rPr lang="en-US" dirty="0"/>
+              <a:t>Caesar cipher example</a:t>
+            </a:r>
+          </a:p>
+        </p:txBody>
+      </p:sp>
+      <p:sp>
+        <p:nvSpPr>
+          <p:cNvPr id="3" name="Content Placeholder 2">
+            <a:extLst>
+              <a:ext uri="{FF2B5EF4-FFF2-40B4-BE49-F238E27FC236}">
+                <a16:creationId xmlns:a16="http://schemas.microsoft.com/office/drawing/2014/main" id="{D07E37D1-F61D-4F72-BA9F-014562611F66}"/>
+              </a:ext>
+            </a:extLst>
+          </p:cNvPr>
+          <p:cNvSpPr>
+            <a:spLocks noGrp="1"/>
+          </p:cNvSpPr>
+          <p:nvPr>
+            <p:ph idx="1"/>
+          </p:nvPr>
+        </p:nvSpPr>
+        <p:spPr/>
+        <p:txBody>
+          <a:bodyPr>
+            <a:normAutofit/>
+          </a:bodyPr>
+          <a:lstStyle/>
+          <a:p>
+            <a:r>
+              <a:rPr lang="en-US" sz="4000" dirty="0"/>
+              <a:t>Rule = add 2</a:t>
+            </a:r>
+          </a:p>
+          <a:p>
+            <a:r>
+              <a:rPr lang="en-US" sz="4000" dirty="0"/>
+              <a:t>Input = A</a:t>
+            </a:r>
+          </a:p>
+          <a:p>
+            <a:r>
+              <a:rPr lang="en-US" sz="4000" dirty="0"/>
+              <a:t>Encryption = C</a:t>
+            </a:r>
+          </a:p>
+          <a:p>
+            <a:r>
+              <a:rPr lang="en-US" sz="4000" dirty="0"/>
+              <a:t>Decryption = A</a:t>
+            </a:r>
+          </a:p>
+        </p:txBody>
+      </p:sp>
+    </p:spTree>
+    <p:extLst>
+      <p:ext uri="{BB962C8B-B14F-4D97-AF65-F5344CB8AC3E}">
+        <p14:creationId xmlns:p14="http://schemas.microsoft.com/office/powerpoint/2010/main" val="3850978264"/>
+      </p:ext>
+    </p:extLst>
+  </p:cSld>
+  <p:clrMapOvr>
+    <a:masterClrMapping/>
+  </p:clrMapOvr>
+</p:sld>
+</file>
+
+<file path=ppt/slides/slide4.xml><?xml version="1.0" encoding="utf-8"?>
 <p:sld xmlns:a="http://schemas.openxmlformats.org/drawingml/2006/main" xmlns:r="http://schemas.openxmlformats.org/officeDocument/2006/relationships" xmlns:p="http://schemas.openxmlformats.org/presentationml/2006/main">
   <p:cSld>
     <p:bg>
@@ -8897,7 +9147,19 @@
           <a:p>
             <a:r>
               <a:rPr lang="en-US" dirty="0"/>
-              <a:t>Node is  its own class, as each node must be an object.</a:t>
+              <a:t>Node is its own class because it is a Noun/thing.</a:t>
+            </a:r>
+          </a:p>
+          <a:p>
+            <a:r>
+              <a:rPr lang="en-US" dirty="0"/>
+              <a:t>Verbs/actions that a Noun does, would be its methods.</a:t>
+            </a:r>
+          </a:p>
+          <a:p>
+            <a:r>
+              <a:rPr lang="en-US" dirty="0"/>
+              <a:t>In our project, Node and LinkedList are classes, while encryption/decryption are methods.</a:t>
             </a:r>
           </a:p>
         </p:txBody>
@@ -8915,7 +9177,7 @@
 </p:sld>
 </file>
 
-<file path=ppt/slides/slide4.xml><?xml version="1.0" encoding="utf-8"?>
+<file path=ppt/slides/slide5.xml><?xml version="1.0" encoding="utf-8"?>
 <p:sld xmlns:a="http://schemas.openxmlformats.org/drawingml/2006/main" xmlns:r="http://schemas.openxmlformats.org/officeDocument/2006/relationships" xmlns:p="http://schemas.openxmlformats.org/presentationml/2006/main">
   <p:cSld>
     <p:bg>
@@ -9066,19 +9328,13 @@
           <a:p>
             <a:r>
               <a:rPr lang="en-US" dirty="0"/>
-              <a:t>We must parse user input for numbers and special characters</a:t>
+              <a:t>We must parse user input for numbers and special characters, only accepting lowercase and uppercase letters</a:t>
             </a:r>
           </a:p>
           <a:p>
             <a:r>
               <a:rPr lang="en-US" dirty="0"/>
               <a:t>A good algorithm will ignore these parameters without adding them to the list or breaking the program </a:t>
-            </a:r>
-          </a:p>
-          <a:p>
-            <a:r>
-              <a:rPr lang="en-US" dirty="0"/>
-              <a:t>Our algorithm will only accept lowercase and uppercase letters</a:t>
             </a:r>
           </a:p>
         </p:txBody>
@@ -9096,7 +9352,7 @@
 </p:sld>
 </file>
 
-<file path=ppt/slides/slide5.xml><?xml version="1.0" encoding="utf-8"?>
+<file path=ppt/slides/slide6.xml><?xml version="1.0" encoding="utf-8"?>
 <p:sld xmlns:a="http://schemas.openxmlformats.org/drawingml/2006/main" xmlns:r="http://schemas.openxmlformats.org/officeDocument/2006/relationships" xmlns:p="http://schemas.openxmlformats.org/presentationml/2006/main">
   <p:cSld>
     <p:spTree>
@@ -9171,6 +9427,60 @@
           </a:xfrm>
         </p:spPr>
       </p:pic>
+      <p:sp>
+        <p:nvSpPr>
+          <p:cNvPr id="6" name="Rectangle 5">
+            <a:extLst>
+              <a:ext uri="{FF2B5EF4-FFF2-40B4-BE49-F238E27FC236}">
+                <a16:creationId xmlns:a16="http://schemas.microsoft.com/office/drawing/2014/main" id="{0BCE457B-BA09-4249-B921-838D5F495A42}"/>
+              </a:ext>
+            </a:extLst>
+          </p:cNvPr>
+          <p:cNvSpPr/>
+          <p:nvPr/>
+        </p:nvSpPr>
+        <p:spPr>
+          <a:xfrm>
+            <a:off x="6032390" y="4314909"/>
+            <a:ext cx="2356237" cy="1057523"/>
+          </a:xfrm>
+          <a:prstGeom prst="rect">
+            <a:avLst/>
+          </a:prstGeom>
+          <a:solidFill>
+            <a:schemeClr val="tx1"/>
+          </a:solidFill>
+          <a:ln>
+            <a:solidFill>
+              <a:schemeClr val="tx1"/>
+            </a:solidFill>
+          </a:ln>
+        </p:spPr>
+        <p:style>
+          <a:lnRef idx="2">
+            <a:schemeClr val="accent1">
+              <a:shade val="50000"/>
+            </a:schemeClr>
+          </a:lnRef>
+          <a:fillRef idx="1">
+            <a:schemeClr val="accent1"/>
+          </a:fillRef>
+          <a:effectRef idx="0">
+            <a:schemeClr val="accent1"/>
+          </a:effectRef>
+          <a:fontRef idx="minor">
+            <a:schemeClr val="lt1"/>
+          </a:fontRef>
+        </p:style>
+        <p:txBody>
+          <a:bodyPr rtlCol="0" anchor="ctr"/>
+          <a:lstStyle/>
+          <a:p>
+            <a:pPr algn="ctr"/>
+            <a:endParaRPr lang="en-US"/>
+          </a:p>
+        </p:txBody>
+      </p:sp>
     </p:spTree>
     <p:extLst>
       <p:ext uri="{BB962C8B-B14F-4D97-AF65-F5344CB8AC3E}">
@@ -9184,7 +9494,7 @@
 </p:sld>
 </file>
 
-<file path=ppt/slides/slide6.xml><?xml version="1.0" encoding="utf-8"?>
+<file path=ppt/slides/slide7.xml><?xml version="1.0" encoding="utf-8"?>
 <p:sld xmlns:a="http://schemas.openxmlformats.org/drawingml/2006/main" xmlns:r="http://schemas.openxmlformats.org/officeDocument/2006/relationships" xmlns:p="http://schemas.openxmlformats.org/presentationml/2006/main">
   <p:cSld>
     <p:bg>
@@ -9360,7 +9670,7 @@
 </p:sld>
 </file>
 
-<file path=ppt/slides/slide7.xml><?xml version="1.0" encoding="utf-8"?>
+<file path=ppt/slides/slide8.xml><?xml version="1.0" encoding="utf-8"?>
 <p:sld xmlns:a="http://schemas.openxmlformats.org/drawingml/2006/main" xmlns:r="http://schemas.openxmlformats.org/officeDocument/2006/relationships" xmlns:p="http://schemas.openxmlformats.org/presentationml/2006/main">
   <p:cSld>
     <p:bg>
@@ -9793,7 +10103,7 @@
 </p:sld>
 </file>
 
-<file path=ppt/slides/slide8.xml><?xml version="1.0" encoding="utf-8"?>
+<file path=ppt/slides/slide9.xml><?xml version="1.0" encoding="utf-8"?>
 <p:sld xmlns:a="http://schemas.openxmlformats.org/drawingml/2006/main" xmlns:r="http://schemas.openxmlformats.org/officeDocument/2006/relationships" xmlns:p="http://schemas.openxmlformats.org/presentationml/2006/main">
   <p:cSld>
     <p:spTree>
@@ -9948,135 +10258,6 @@
     <p:extLst>
       <p:ext uri="{BB962C8B-B14F-4D97-AF65-F5344CB8AC3E}">
         <p14:creationId xmlns:p14="http://schemas.microsoft.com/office/powerpoint/2010/main" val="2943988881"/>
-      </p:ext>
-    </p:extLst>
-  </p:cSld>
-  <p:clrMapOvr>
-    <a:masterClrMapping/>
-  </p:clrMapOvr>
-</p:sld>
-</file>
-
-<file path=ppt/slides/slide9.xml><?xml version="1.0" encoding="utf-8"?>
-<p:sld xmlns:a="http://schemas.openxmlformats.org/drawingml/2006/main" xmlns:r="http://schemas.openxmlformats.org/officeDocument/2006/relationships" xmlns:p="http://schemas.openxmlformats.org/presentationml/2006/main">
-  <p:cSld>
-    <p:spTree>
-      <p:nvGrpSpPr>
-        <p:cNvPr id="1" name=""/>
-        <p:cNvGrpSpPr/>
-        <p:nvPr/>
-      </p:nvGrpSpPr>
-      <p:grpSpPr>
-        <a:xfrm>
-          <a:off x="0" y="0"/>
-          <a:ext cx="0" cy="0"/>
-          <a:chOff x="0" y="0"/>
-          <a:chExt cx="0" cy="0"/>
-        </a:xfrm>
-      </p:grpSpPr>
-      <p:sp>
-        <p:nvSpPr>
-          <p:cNvPr id="2" name="Title 1">
-            <a:extLst>
-              <a:ext uri="{FF2B5EF4-FFF2-40B4-BE49-F238E27FC236}">
-                <a16:creationId xmlns:a16="http://schemas.microsoft.com/office/drawing/2014/main" id="{8319EC3C-0EDE-42E7-B279-4F8B4475E1CF}"/>
-              </a:ext>
-            </a:extLst>
-          </p:cNvPr>
-          <p:cNvSpPr>
-            <a:spLocks noGrp="1"/>
-          </p:cNvSpPr>
-          <p:nvPr>
-            <p:ph type="title"/>
-          </p:nvPr>
-        </p:nvSpPr>
-        <p:spPr>
-          <a:xfrm>
-            <a:off x="1030287" y="635726"/>
-            <a:ext cx="10131425" cy="1456267"/>
-          </a:xfrm>
-        </p:spPr>
-        <p:txBody>
-          <a:bodyPr/>
-          <a:lstStyle/>
-          <a:p>
-            <a:pPr algn="ctr"/>
-            <a:r>
-              <a:rPr lang="en-US" dirty="0"/>
-              <a:t>Caesar cipher</a:t>
-            </a:r>
-          </a:p>
-        </p:txBody>
-      </p:sp>
-      <p:sp>
-        <p:nvSpPr>
-          <p:cNvPr id="6" name="TextBox 5">
-            <a:extLst>
-              <a:ext uri="{FF2B5EF4-FFF2-40B4-BE49-F238E27FC236}">
-                <a16:creationId xmlns:a16="http://schemas.microsoft.com/office/drawing/2014/main" id="{67F9E4E2-F0EF-47ED-A7E6-EEE76285E3FB}"/>
-              </a:ext>
-            </a:extLst>
-          </p:cNvPr>
-          <p:cNvSpPr txBox="1"/>
-          <p:nvPr/>
-        </p:nvSpPr>
-        <p:spPr>
-          <a:xfrm>
-            <a:off x="1293222" y="2091993"/>
-            <a:ext cx="9605554" cy="523220"/>
-          </a:xfrm>
-          <a:prstGeom prst="rect">
-            <a:avLst/>
-          </a:prstGeom>
-          <a:noFill/>
-        </p:spPr>
-        <p:txBody>
-          <a:bodyPr wrap="square" rtlCol="0">
-            <a:spAutoFit/>
-          </a:bodyPr>
-          <a:lstStyle/>
-          <a:p>
-            <a:pPr algn="ctr"/>
-            <a:r>
-              <a:rPr lang="en-US" sz="2800" dirty="0"/>
-              <a:t>Final result with letter shift of five (5).</a:t>
-            </a:r>
-          </a:p>
-        </p:txBody>
-      </p:sp>
-      <p:pic>
-        <p:nvPicPr>
-          <p:cNvPr id="10" name="Content Placeholder 9">
-            <a:extLst>
-              <a:ext uri="{FF2B5EF4-FFF2-40B4-BE49-F238E27FC236}">
-                <a16:creationId xmlns:a16="http://schemas.microsoft.com/office/drawing/2014/main" id="{BF3075F7-927F-4B61-9A0D-7CF3DF11BE86}"/>
-              </a:ext>
-            </a:extLst>
-          </p:cNvPr>
-          <p:cNvPicPr>
-            <a:picLocks noGrp="1" noChangeAspect="1"/>
-          </p:cNvPicPr>
-          <p:nvPr>
-            <p:ph idx="1"/>
-          </p:nvPr>
-        </p:nvPicPr>
-        <p:blipFill>
-          <a:blip r:embed="rId2"/>
-          <a:stretch>
-            <a:fillRect/>
-          </a:stretch>
-        </p:blipFill>
-        <p:spPr>
-          <a:xfrm>
-            <a:off x="183312" y="2858403"/>
-            <a:ext cx="11825374" cy="2662832"/>
-          </a:xfrm>
-        </p:spPr>
-      </p:pic>
-    </p:spTree>
-    <p:extLst>
-      <p:ext uri="{BB962C8B-B14F-4D97-AF65-F5344CB8AC3E}">
-        <p14:creationId xmlns:p14="http://schemas.microsoft.com/office/powerpoint/2010/main" val="2119457388"/>
       </p:ext>
     </p:extLst>
   </p:cSld>

</xml_diff>

<commit_message>
FINAL caesar cipher powerpoint
</commit_message>
<xml_diff>
--- a/CaesarCipher_CIS113_DW.pptx
+++ b/CaesarCipher_CIS113_DW.pptx
@@ -11,11 +11,14 @@
     <p:sldId id="260" r:id="rId5"/>
     <p:sldId id="258" r:id="rId6"/>
     <p:sldId id="257" r:id="rId7"/>
-    <p:sldId id="261" r:id="rId8"/>
-    <p:sldId id="262" r:id="rId9"/>
-    <p:sldId id="263" r:id="rId10"/>
-    <p:sldId id="264" r:id="rId11"/>
-    <p:sldId id="265" r:id="rId12"/>
+    <p:sldId id="267" r:id="rId8"/>
+    <p:sldId id="268" r:id="rId9"/>
+    <p:sldId id="269" r:id="rId10"/>
+    <p:sldId id="261" r:id="rId11"/>
+    <p:sldId id="262" r:id="rId12"/>
+    <p:sldId id="263" r:id="rId13"/>
+    <p:sldId id="264" r:id="rId14"/>
+    <p:sldId id="265" r:id="rId15"/>
   </p:sldIdLst>
   <p:sldSz cx="12192000" cy="6858000"/>
   <p:notesSz cx="6858000" cy="9144000"/>
@@ -114,6 +117,11 @@
       </a:defRPr>
     </a:lvl9pPr>
   </p:defaultTextStyle>
+  <p:extLst>
+    <p:ext uri="{EFAFB233-063F-42B5-8137-9DF3F51BA10A}">
+      <p15:sldGuideLst xmlns:p15="http://schemas.microsoft.com/office/powerpoint/2012/main"/>
+    </p:ext>
+  </p:extLst>
 </p:presentation>
 </file>
 
@@ -8554,949 +8562,6 @@
 <file path=ppt/slides/slide10.xml><?xml version="1.0" encoding="utf-8"?>
 <p:sld xmlns:a="http://schemas.openxmlformats.org/drawingml/2006/main" xmlns:r="http://schemas.openxmlformats.org/officeDocument/2006/relationships" xmlns:p="http://schemas.openxmlformats.org/presentationml/2006/main">
   <p:cSld>
-    <p:spTree>
-      <p:nvGrpSpPr>
-        <p:cNvPr id="1" name=""/>
-        <p:cNvGrpSpPr/>
-        <p:nvPr/>
-      </p:nvGrpSpPr>
-      <p:grpSpPr>
-        <a:xfrm>
-          <a:off x="0" y="0"/>
-          <a:ext cx="0" cy="0"/>
-          <a:chOff x="0" y="0"/>
-          <a:chExt cx="0" cy="0"/>
-        </a:xfrm>
-      </p:grpSpPr>
-      <p:sp>
-        <p:nvSpPr>
-          <p:cNvPr id="2" name="Title 1">
-            <a:extLst>
-              <a:ext uri="{FF2B5EF4-FFF2-40B4-BE49-F238E27FC236}">
-                <a16:creationId xmlns:a16="http://schemas.microsoft.com/office/drawing/2014/main" id="{8319EC3C-0EDE-42E7-B279-4F8B4475E1CF}"/>
-              </a:ext>
-            </a:extLst>
-          </p:cNvPr>
-          <p:cNvSpPr>
-            <a:spLocks noGrp="1"/>
-          </p:cNvSpPr>
-          <p:nvPr>
-            <p:ph type="title"/>
-          </p:nvPr>
-        </p:nvSpPr>
-        <p:spPr>
-          <a:xfrm>
-            <a:off x="1030287" y="635726"/>
-            <a:ext cx="10131425" cy="1456267"/>
-          </a:xfrm>
-        </p:spPr>
-        <p:txBody>
-          <a:bodyPr/>
-          <a:lstStyle/>
-          <a:p>
-            <a:pPr algn="ctr"/>
-            <a:r>
-              <a:rPr lang="en-US" dirty="0"/>
-              <a:t>Caesar cipher</a:t>
-            </a:r>
-          </a:p>
-        </p:txBody>
-      </p:sp>
-      <p:sp>
-        <p:nvSpPr>
-          <p:cNvPr id="6" name="TextBox 5">
-            <a:extLst>
-              <a:ext uri="{FF2B5EF4-FFF2-40B4-BE49-F238E27FC236}">
-                <a16:creationId xmlns:a16="http://schemas.microsoft.com/office/drawing/2014/main" id="{67F9E4E2-F0EF-47ED-A7E6-EEE76285E3FB}"/>
-              </a:ext>
-            </a:extLst>
-          </p:cNvPr>
-          <p:cNvSpPr txBox="1"/>
-          <p:nvPr/>
-        </p:nvSpPr>
-        <p:spPr>
-          <a:xfrm>
-            <a:off x="1293222" y="2091993"/>
-            <a:ext cx="9605554" cy="523220"/>
-          </a:xfrm>
-          <a:prstGeom prst="rect">
-            <a:avLst/>
-          </a:prstGeom>
-          <a:noFill/>
-        </p:spPr>
-        <p:txBody>
-          <a:bodyPr wrap="square" rtlCol="0">
-            <a:spAutoFit/>
-          </a:bodyPr>
-          <a:lstStyle/>
-          <a:p>
-            <a:pPr algn="ctr"/>
-            <a:r>
-              <a:rPr lang="en-US" sz="2800" dirty="0"/>
-              <a:t>Final result with letter shift of five (5).</a:t>
-            </a:r>
-          </a:p>
-        </p:txBody>
-      </p:sp>
-      <p:pic>
-        <p:nvPicPr>
-          <p:cNvPr id="10" name="Content Placeholder 9">
-            <a:extLst>
-              <a:ext uri="{FF2B5EF4-FFF2-40B4-BE49-F238E27FC236}">
-                <a16:creationId xmlns:a16="http://schemas.microsoft.com/office/drawing/2014/main" id="{BF3075F7-927F-4B61-9A0D-7CF3DF11BE86}"/>
-              </a:ext>
-            </a:extLst>
-          </p:cNvPr>
-          <p:cNvPicPr>
-            <a:picLocks noGrp="1" noChangeAspect="1"/>
-          </p:cNvPicPr>
-          <p:nvPr>
-            <p:ph idx="1"/>
-          </p:nvPr>
-        </p:nvPicPr>
-        <p:blipFill>
-          <a:blip r:embed="rId2"/>
-          <a:stretch>
-            <a:fillRect/>
-          </a:stretch>
-        </p:blipFill>
-        <p:spPr>
-          <a:xfrm>
-            <a:off x="183312" y="2858403"/>
-            <a:ext cx="11825374" cy="2662832"/>
-          </a:xfrm>
-        </p:spPr>
-      </p:pic>
-    </p:spTree>
-    <p:extLst>
-      <p:ext uri="{BB962C8B-B14F-4D97-AF65-F5344CB8AC3E}">
-        <p14:creationId xmlns:p14="http://schemas.microsoft.com/office/powerpoint/2010/main" val="2119457388"/>
-      </p:ext>
-    </p:extLst>
-  </p:cSld>
-  <p:clrMapOvr>
-    <a:masterClrMapping/>
-  </p:clrMapOvr>
-</p:sld>
-</file>
-
-<file path=ppt/slides/slide11.xml><?xml version="1.0" encoding="utf-8"?>
-<p:sld xmlns:a="http://schemas.openxmlformats.org/drawingml/2006/main" xmlns:r="http://schemas.openxmlformats.org/officeDocument/2006/relationships" xmlns:p="http://schemas.openxmlformats.org/presentationml/2006/main">
-  <p:cSld>
-    <p:spTree>
-      <p:nvGrpSpPr>
-        <p:cNvPr id="1" name=""/>
-        <p:cNvGrpSpPr/>
-        <p:nvPr/>
-      </p:nvGrpSpPr>
-      <p:grpSpPr>
-        <a:xfrm>
-          <a:off x="0" y="0"/>
-          <a:ext cx="0" cy="0"/>
-          <a:chOff x="0" y="0"/>
-          <a:chExt cx="0" cy="0"/>
-        </a:xfrm>
-      </p:grpSpPr>
-      <p:sp>
-        <p:nvSpPr>
-          <p:cNvPr id="2" name="Title 1">
-            <a:extLst>
-              <a:ext uri="{FF2B5EF4-FFF2-40B4-BE49-F238E27FC236}">
-                <a16:creationId xmlns:a16="http://schemas.microsoft.com/office/drawing/2014/main" id="{F7F8F481-A898-408E-AF04-54EC8A03D37E}"/>
-              </a:ext>
-            </a:extLst>
-          </p:cNvPr>
-          <p:cNvSpPr>
-            <a:spLocks noGrp="1"/>
-          </p:cNvSpPr>
-          <p:nvPr>
-            <p:ph type="title"/>
-          </p:nvPr>
-        </p:nvSpPr>
-        <p:spPr/>
-        <p:txBody>
-          <a:bodyPr/>
-          <a:lstStyle/>
-          <a:p>
-            <a:pPr algn="ctr"/>
-            <a:r>
-              <a:rPr lang="en-US" dirty="0"/>
-              <a:t>Final notes</a:t>
-            </a:r>
-          </a:p>
-        </p:txBody>
-      </p:sp>
-      <p:sp>
-        <p:nvSpPr>
-          <p:cNvPr id="3" name="Content Placeholder 2">
-            <a:extLst>
-              <a:ext uri="{FF2B5EF4-FFF2-40B4-BE49-F238E27FC236}">
-                <a16:creationId xmlns:a16="http://schemas.microsoft.com/office/drawing/2014/main" id="{5321E345-5275-44C5-B127-E6FD1737941E}"/>
-              </a:ext>
-            </a:extLst>
-          </p:cNvPr>
-          <p:cNvSpPr>
-            <a:spLocks noGrp="1"/>
-          </p:cNvSpPr>
-          <p:nvPr>
-            <p:ph idx="1"/>
-          </p:nvPr>
-        </p:nvSpPr>
-        <p:spPr/>
-        <p:txBody>
-          <a:bodyPr>
-            <a:normAutofit/>
-          </a:bodyPr>
-          <a:lstStyle/>
-          <a:p>
-            <a:r>
-              <a:rPr lang="en-US" sz="3600"/>
-              <a:t>All </a:t>
-            </a:r>
-            <a:r>
-              <a:rPr lang="en-US" sz="3600" dirty="0"/>
-              <a:t>non-letters are replaced with whitespace through a regex expression below.</a:t>
-            </a:r>
-          </a:p>
-          <a:p>
-            <a:r>
-              <a:rPr lang="en-US" sz="3200" b="1" dirty="0"/>
-              <a:t>String str = </a:t>
-            </a:r>
-            <a:r>
-              <a:rPr lang="en-US" sz="3200" b="1" i="1" dirty="0" err="1"/>
-              <a:t>text.replaceAll</a:t>
-            </a:r>
-            <a:r>
-              <a:rPr lang="en-US" sz="3200" b="1" i="1" dirty="0"/>
-              <a:t>("[^\\p{</a:t>
-            </a:r>
-            <a:r>
-              <a:rPr lang="en-US" sz="3200" b="1" i="1" dirty="0" err="1"/>
-              <a:t>Alnum</a:t>
-            </a:r>
-            <a:r>
-              <a:rPr lang="en-US" sz="3200" b="1" i="1" dirty="0"/>
-              <a:t>}]+", " ");</a:t>
-            </a:r>
-            <a:endParaRPr lang="en-US" sz="3200" dirty="0"/>
-          </a:p>
-        </p:txBody>
-      </p:sp>
-    </p:spTree>
-    <p:extLst>
-      <p:ext uri="{BB962C8B-B14F-4D97-AF65-F5344CB8AC3E}">
-        <p14:creationId xmlns:p14="http://schemas.microsoft.com/office/powerpoint/2010/main" val="252575413"/>
-      </p:ext>
-    </p:extLst>
-  </p:cSld>
-  <p:clrMapOvr>
-    <a:masterClrMapping/>
-  </p:clrMapOvr>
-</p:sld>
-</file>
-
-<file path=ppt/slides/slide2.xml><?xml version="1.0" encoding="utf-8"?>
-<p:sld xmlns:a="http://schemas.openxmlformats.org/drawingml/2006/main" xmlns:r="http://schemas.openxmlformats.org/officeDocument/2006/relationships" xmlns:p="http://schemas.openxmlformats.org/presentationml/2006/main">
-  <p:cSld>
-    <p:spTree>
-      <p:nvGrpSpPr>
-        <p:cNvPr id="1" name=""/>
-        <p:cNvGrpSpPr/>
-        <p:nvPr/>
-      </p:nvGrpSpPr>
-      <p:grpSpPr>
-        <a:xfrm>
-          <a:off x="0" y="0"/>
-          <a:ext cx="0" cy="0"/>
-          <a:chOff x="0" y="0"/>
-          <a:chExt cx="0" cy="0"/>
-        </a:xfrm>
-      </p:grpSpPr>
-      <p:sp>
-        <p:nvSpPr>
-          <p:cNvPr id="2" name="Title 1">
-            <a:extLst>
-              <a:ext uri="{FF2B5EF4-FFF2-40B4-BE49-F238E27FC236}">
-                <a16:creationId xmlns:a16="http://schemas.microsoft.com/office/drawing/2014/main" id="{17CEDFC3-507A-4282-BE64-EF771D1A5723}"/>
-              </a:ext>
-            </a:extLst>
-          </p:cNvPr>
-          <p:cNvSpPr>
-            <a:spLocks noGrp="1"/>
-          </p:cNvSpPr>
-          <p:nvPr>
-            <p:ph type="title"/>
-          </p:nvPr>
-        </p:nvSpPr>
-        <p:spPr>
-          <a:xfrm>
-            <a:off x="685800" y="171848"/>
-            <a:ext cx="10131425" cy="1456267"/>
-          </a:xfrm>
-        </p:spPr>
-        <p:txBody>
-          <a:bodyPr/>
-          <a:lstStyle/>
-          <a:p>
-            <a:pPr algn="ctr"/>
-            <a:r>
-              <a:rPr lang="en-US" dirty="0"/>
-              <a:t>How to code a Caesar cipher</a:t>
-            </a:r>
-          </a:p>
-        </p:txBody>
-      </p:sp>
-      <p:pic>
-        <p:nvPicPr>
-          <p:cNvPr id="5" name="Content Placeholder 4">
-            <a:extLst>
-              <a:ext uri="{FF2B5EF4-FFF2-40B4-BE49-F238E27FC236}">
-                <a16:creationId xmlns:a16="http://schemas.microsoft.com/office/drawing/2014/main" id="{B643E8C6-B49E-4D95-A0BE-4D44FE53C05D}"/>
-              </a:ext>
-            </a:extLst>
-          </p:cNvPr>
-          <p:cNvPicPr>
-            <a:picLocks noGrp="1" noChangeAspect="1"/>
-          </p:cNvPicPr>
-          <p:nvPr>
-            <p:ph idx="1"/>
-          </p:nvPr>
-        </p:nvPicPr>
-        <p:blipFill>
-          <a:blip r:embed="rId2"/>
-          <a:stretch>
-            <a:fillRect/>
-          </a:stretch>
-        </p:blipFill>
-        <p:spPr>
-          <a:xfrm>
-            <a:off x="821069" y="1497874"/>
-            <a:ext cx="10549862" cy="5188278"/>
-          </a:xfrm>
-        </p:spPr>
-      </p:pic>
-    </p:spTree>
-    <p:extLst>
-      <p:ext uri="{BB962C8B-B14F-4D97-AF65-F5344CB8AC3E}">
-        <p14:creationId xmlns:p14="http://schemas.microsoft.com/office/powerpoint/2010/main" val="4165465711"/>
-      </p:ext>
-    </p:extLst>
-  </p:cSld>
-  <p:clrMapOvr>
-    <a:masterClrMapping/>
-  </p:clrMapOvr>
-</p:sld>
-</file>
-
-<file path=ppt/slides/slide3.xml><?xml version="1.0" encoding="utf-8"?>
-<p:sld xmlns:a="http://schemas.openxmlformats.org/drawingml/2006/main" xmlns:r="http://schemas.openxmlformats.org/officeDocument/2006/relationships" xmlns:p="http://schemas.openxmlformats.org/presentationml/2006/main">
-  <p:cSld>
-    <p:spTree>
-      <p:nvGrpSpPr>
-        <p:cNvPr id="1" name=""/>
-        <p:cNvGrpSpPr/>
-        <p:nvPr/>
-      </p:nvGrpSpPr>
-      <p:grpSpPr>
-        <a:xfrm>
-          <a:off x="0" y="0"/>
-          <a:ext cx="0" cy="0"/>
-          <a:chOff x="0" y="0"/>
-          <a:chExt cx="0" cy="0"/>
-        </a:xfrm>
-      </p:grpSpPr>
-      <p:sp>
-        <p:nvSpPr>
-          <p:cNvPr id="2" name="Title 1">
-            <a:extLst>
-              <a:ext uri="{FF2B5EF4-FFF2-40B4-BE49-F238E27FC236}">
-                <a16:creationId xmlns:a16="http://schemas.microsoft.com/office/drawing/2014/main" id="{178072B4-2BEB-4869-9BAF-9CEE70941B10}"/>
-              </a:ext>
-            </a:extLst>
-          </p:cNvPr>
-          <p:cNvSpPr>
-            <a:spLocks noGrp="1"/>
-          </p:cNvSpPr>
-          <p:nvPr>
-            <p:ph type="title"/>
-          </p:nvPr>
-        </p:nvSpPr>
-        <p:spPr/>
-        <p:txBody>
-          <a:bodyPr/>
-          <a:lstStyle/>
-          <a:p>
-            <a:pPr algn="ctr"/>
-            <a:r>
-              <a:rPr lang="en-US" dirty="0"/>
-              <a:t>Caesar cipher example</a:t>
-            </a:r>
-          </a:p>
-        </p:txBody>
-      </p:sp>
-      <p:sp>
-        <p:nvSpPr>
-          <p:cNvPr id="3" name="Content Placeholder 2">
-            <a:extLst>
-              <a:ext uri="{FF2B5EF4-FFF2-40B4-BE49-F238E27FC236}">
-                <a16:creationId xmlns:a16="http://schemas.microsoft.com/office/drawing/2014/main" id="{D07E37D1-F61D-4F72-BA9F-014562611F66}"/>
-              </a:ext>
-            </a:extLst>
-          </p:cNvPr>
-          <p:cNvSpPr>
-            <a:spLocks noGrp="1"/>
-          </p:cNvSpPr>
-          <p:nvPr>
-            <p:ph idx="1"/>
-          </p:nvPr>
-        </p:nvSpPr>
-        <p:spPr/>
-        <p:txBody>
-          <a:bodyPr>
-            <a:normAutofit/>
-          </a:bodyPr>
-          <a:lstStyle/>
-          <a:p>
-            <a:r>
-              <a:rPr lang="en-US" sz="4000" dirty="0"/>
-              <a:t>Rule = add 2</a:t>
-            </a:r>
-          </a:p>
-          <a:p>
-            <a:r>
-              <a:rPr lang="en-US" sz="4000" dirty="0"/>
-              <a:t>Input = A</a:t>
-            </a:r>
-          </a:p>
-          <a:p>
-            <a:r>
-              <a:rPr lang="en-US" sz="4000" dirty="0"/>
-              <a:t>Encryption = C</a:t>
-            </a:r>
-          </a:p>
-          <a:p>
-            <a:r>
-              <a:rPr lang="en-US" sz="4000" dirty="0"/>
-              <a:t>Decryption = A</a:t>
-            </a:r>
-          </a:p>
-        </p:txBody>
-      </p:sp>
-    </p:spTree>
-    <p:extLst>
-      <p:ext uri="{BB962C8B-B14F-4D97-AF65-F5344CB8AC3E}">
-        <p14:creationId xmlns:p14="http://schemas.microsoft.com/office/powerpoint/2010/main" val="3850978264"/>
-      </p:ext>
-    </p:extLst>
-  </p:cSld>
-  <p:clrMapOvr>
-    <a:masterClrMapping/>
-  </p:clrMapOvr>
-</p:sld>
-</file>
-
-<file path=ppt/slides/slide4.xml><?xml version="1.0" encoding="utf-8"?>
-<p:sld xmlns:a="http://schemas.openxmlformats.org/drawingml/2006/main" xmlns:r="http://schemas.openxmlformats.org/officeDocument/2006/relationships" xmlns:p="http://schemas.openxmlformats.org/presentationml/2006/main">
-  <p:cSld>
-    <p:bg>
-      <p:bgPr>
-        <a:blipFill>
-          <a:blip r:embed="rId2">
-            <a:extLst/>
-          </a:blip>
-          <a:stretch/>
-        </a:blipFill>
-        <a:effectLst/>
-      </p:bgPr>
-    </p:bg>
-    <p:spTree>
-      <p:nvGrpSpPr>
-        <p:cNvPr id="1" name=""/>
-        <p:cNvGrpSpPr/>
-        <p:nvPr/>
-      </p:nvGrpSpPr>
-      <p:grpSpPr>
-        <a:xfrm>
-          <a:off x="0" y="0"/>
-          <a:ext cx="0" cy="0"/>
-          <a:chOff x="0" y="0"/>
-          <a:chExt cx="0" cy="0"/>
-        </a:xfrm>
-      </p:grpSpPr>
-      <p:sp>
-        <p:nvSpPr>
-          <p:cNvPr id="2" name="Title 1">
-            <a:extLst>
-              <a:ext uri="{FF2B5EF4-FFF2-40B4-BE49-F238E27FC236}">
-                <a16:creationId xmlns:a16="http://schemas.microsoft.com/office/drawing/2014/main" id="{9A424015-EA10-4326-89DE-141E2889EDE9}"/>
-              </a:ext>
-            </a:extLst>
-          </p:cNvPr>
-          <p:cNvSpPr>
-            <a:spLocks noGrp="1"/>
-          </p:cNvSpPr>
-          <p:nvPr>
-            <p:ph type="title"/>
-          </p:nvPr>
-        </p:nvSpPr>
-        <p:spPr>
-          <a:xfrm>
-            <a:off x="7865806" y="643463"/>
-            <a:ext cx="3706762" cy="1608124"/>
-          </a:xfrm>
-        </p:spPr>
-        <p:txBody>
-          <a:bodyPr>
-            <a:normAutofit fontScale="90000"/>
-          </a:bodyPr>
-          <a:lstStyle/>
-          <a:p>
-            <a:r>
-              <a:rPr lang="en-US" dirty="0"/>
-              <a:t>How to initialize a linked list</a:t>
-            </a:r>
-          </a:p>
-        </p:txBody>
-      </p:sp>
-      <p:pic>
-        <p:nvPicPr>
-          <p:cNvPr id="8" name="Content Placeholder 4">
-            <a:extLst>
-              <a:ext uri="{FF2B5EF4-FFF2-40B4-BE49-F238E27FC236}">
-                <a16:creationId xmlns:a16="http://schemas.microsoft.com/office/drawing/2014/main" id="{07B4EB60-E6CF-4750-8339-06C33E21D45A}"/>
-              </a:ext>
-            </a:extLst>
-          </p:cNvPr>
-          <p:cNvPicPr>
-            <a:picLocks noChangeAspect="1"/>
-          </p:cNvPicPr>
-          <p:nvPr/>
-        </p:nvPicPr>
-        <p:blipFill>
-          <a:blip r:embed="rId3"/>
-          <a:stretch>
-            <a:fillRect/>
-          </a:stretch>
-        </p:blipFill>
-        <p:spPr>
-          <a:xfrm>
-            <a:off x="27792" y="643463"/>
-            <a:ext cx="7513550" cy="5818298"/>
-          </a:xfrm>
-          <a:prstGeom prst="roundRect">
-            <a:avLst>
-              <a:gd name="adj" fmla="val 4380"/>
-            </a:avLst>
-          </a:prstGeom>
-          <a:ln w="50800" cap="sq" cmpd="dbl">
-            <a:gradFill flip="none" rotWithShape="1">
-              <a:gsLst>
-                <a:gs pos="0">
-                  <a:srgbClr val="FFFFFF"/>
-                </a:gs>
-                <a:gs pos="100000">
-                  <a:schemeClr val="tx1">
-                    <a:alpha val="0"/>
-                  </a:schemeClr>
-                </a:gs>
-              </a:gsLst>
-              <a:path path="circle">
-                <a:fillToRect l="50000" t="50000" r="50000" b="50000"/>
-              </a:path>
-              <a:tileRect/>
-            </a:gradFill>
-            <a:miter lim="800000"/>
-          </a:ln>
-          <a:effectLst>
-            <a:outerShdw blurRad="254000" algn="tl" rotWithShape="0">
-              <a:srgbClr val="000000">
-                <a:alpha val="43000"/>
-              </a:srgbClr>
-            </a:outerShdw>
-          </a:effectLst>
-        </p:spPr>
-      </p:pic>
-      <p:sp>
-        <p:nvSpPr>
-          <p:cNvPr id="10" name="Content Placeholder 9">
-            <a:extLst>
-              <a:ext uri="{FF2B5EF4-FFF2-40B4-BE49-F238E27FC236}">
-                <a16:creationId xmlns:a16="http://schemas.microsoft.com/office/drawing/2014/main" id="{352D05EE-812C-4591-B656-A00B179C86DA}"/>
-              </a:ext>
-            </a:extLst>
-          </p:cNvPr>
-          <p:cNvSpPr>
-            <a:spLocks noGrp="1"/>
-          </p:cNvSpPr>
-          <p:nvPr>
-            <p:ph idx="1"/>
-          </p:nvPr>
-        </p:nvSpPr>
-        <p:spPr>
-          <a:xfrm>
-            <a:off x="7865806" y="2251587"/>
-            <a:ext cx="3706762" cy="3972232"/>
-          </a:xfrm>
-        </p:spPr>
-        <p:txBody>
-          <a:bodyPr>
-            <a:normAutofit/>
-          </a:bodyPr>
-          <a:lstStyle/>
-          <a:p>
-            <a:r>
-              <a:rPr lang="en-US" dirty="0"/>
-              <a:t>Node is its own class because it is a Noun/thing.</a:t>
-            </a:r>
-          </a:p>
-          <a:p>
-            <a:r>
-              <a:rPr lang="en-US" dirty="0"/>
-              <a:t>Verbs/actions that a Noun does, would be its methods.</a:t>
-            </a:r>
-          </a:p>
-          <a:p>
-            <a:r>
-              <a:rPr lang="en-US" dirty="0"/>
-              <a:t>In our project, Node and LinkedList are classes, while encryption/decryption are methods.</a:t>
-            </a:r>
-          </a:p>
-        </p:txBody>
-      </p:sp>
-    </p:spTree>
-    <p:extLst>
-      <p:ext uri="{BB962C8B-B14F-4D97-AF65-F5344CB8AC3E}">
-        <p14:creationId xmlns:p14="http://schemas.microsoft.com/office/powerpoint/2010/main" val="695976237"/>
-      </p:ext>
-    </p:extLst>
-  </p:cSld>
-  <p:clrMapOvr>
-    <a:masterClrMapping/>
-  </p:clrMapOvr>
-</p:sld>
-</file>
-
-<file path=ppt/slides/slide5.xml><?xml version="1.0" encoding="utf-8"?>
-<p:sld xmlns:a="http://schemas.openxmlformats.org/drawingml/2006/main" xmlns:r="http://schemas.openxmlformats.org/officeDocument/2006/relationships" xmlns:p="http://schemas.openxmlformats.org/presentationml/2006/main">
-  <p:cSld>
-    <p:bg>
-      <p:bgPr>
-        <a:blipFill>
-          <a:blip r:embed="rId2">
-            <a:extLst/>
-          </a:blip>
-          <a:stretch/>
-        </a:blipFill>
-        <a:effectLst/>
-      </p:bgPr>
-    </p:bg>
-    <p:spTree>
-      <p:nvGrpSpPr>
-        <p:cNvPr id="1" name=""/>
-        <p:cNvGrpSpPr/>
-        <p:nvPr/>
-      </p:nvGrpSpPr>
-      <p:grpSpPr>
-        <a:xfrm>
-          <a:off x="0" y="0"/>
-          <a:ext cx="0" cy="0"/>
-          <a:chOff x="0" y="0"/>
-          <a:chExt cx="0" cy="0"/>
-        </a:xfrm>
-      </p:grpSpPr>
-      <p:sp>
-        <p:nvSpPr>
-          <p:cNvPr id="2" name="Title 1">
-            <a:extLst>
-              <a:ext uri="{FF2B5EF4-FFF2-40B4-BE49-F238E27FC236}">
-                <a16:creationId xmlns:a16="http://schemas.microsoft.com/office/drawing/2014/main" id="{2BD3BDA2-9820-423C-B414-C98F3DEE6A33}"/>
-              </a:ext>
-            </a:extLst>
-          </p:cNvPr>
-          <p:cNvSpPr>
-            <a:spLocks noGrp="1"/>
-          </p:cNvSpPr>
-          <p:nvPr>
-            <p:ph type="title"/>
-          </p:nvPr>
-        </p:nvSpPr>
-        <p:spPr>
-          <a:xfrm>
-            <a:off x="7865806" y="643463"/>
-            <a:ext cx="3706762" cy="1608124"/>
-          </a:xfrm>
-        </p:spPr>
-        <p:txBody>
-          <a:bodyPr>
-            <a:normAutofit/>
-          </a:bodyPr>
-          <a:lstStyle/>
-          <a:p>
-            <a:r>
-              <a:rPr lang="en-US" dirty="0"/>
-              <a:t>Appending a linked list</a:t>
-            </a:r>
-          </a:p>
-        </p:txBody>
-      </p:sp>
-      <p:pic>
-        <p:nvPicPr>
-          <p:cNvPr id="8" name="Content Placeholder 4">
-            <a:extLst>
-              <a:ext uri="{FF2B5EF4-FFF2-40B4-BE49-F238E27FC236}">
-                <a16:creationId xmlns:a16="http://schemas.microsoft.com/office/drawing/2014/main" id="{5B610694-9EFA-4CD8-BEAD-BC37D88A17A5}"/>
-              </a:ext>
-            </a:extLst>
-          </p:cNvPr>
-          <p:cNvPicPr>
-            <a:picLocks noChangeAspect="1"/>
-          </p:cNvPicPr>
-          <p:nvPr/>
-        </p:nvPicPr>
-        <p:blipFill>
-          <a:blip r:embed="rId3"/>
-          <a:stretch>
-            <a:fillRect/>
-          </a:stretch>
-        </p:blipFill>
-        <p:spPr>
-          <a:xfrm>
-            <a:off x="619432" y="76074"/>
-            <a:ext cx="6685280" cy="6705851"/>
-          </a:xfrm>
-          <a:prstGeom prst="roundRect">
-            <a:avLst>
-              <a:gd name="adj" fmla="val 4380"/>
-            </a:avLst>
-          </a:prstGeom>
-          <a:ln w="50800" cap="sq" cmpd="dbl">
-            <a:gradFill flip="none" rotWithShape="1">
-              <a:gsLst>
-                <a:gs pos="0">
-                  <a:srgbClr val="FFFFFF"/>
-                </a:gs>
-                <a:gs pos="100000">
-                  <a:schemeClr val="tx1">
-                    <a:alpha val="0"/>
-                  </a:schemeClr>
-                </a:gs>
-              </a:gsLst>
-              <a:path path="circle">
-                <a:fillToRect l="50000" t="50000" r="50000" b="50000"/>
-              </a:path>
-              <a:tileRect/>
-            </a:gradFill>
-            <a:miter lim="800000"/>
-          </a:ln>
-          <a:effectLst>
-            <a:outerShdw blurRad="254000" algn="tl" rotWithShape="0">
-              <a:srgbClr val="000000">
-                <a:alpha val="43000"/>
-              </a:srgbClr>
-            </a:outerShdw>
-          </a:effectLst>
-        </p:spPr>
-      </p:pic>
-      <p:sp>
-        <p:nvSpPr>
-          <p:cNvPr id="10" name="Content Placeholder 9">
-            <a:extLst>
-              <a:ext uri="{FF2B5EF4-FFF2-40B4-BE49-F238E27FC236}">
-                <a16:creationId xmlns:a16="http://schemas.microsoft.com/office/drawing/2014/main" id="{86B2D5E2-E252-4EED-874A-36A8D802A898}"/>
-              </a:ext>
-            </a:extLst>
-          </p:cNvPr>
-          <p:cNvSpPr>
-            <a:spLocks noGrp="1"/>
-          </p:cNvSpPr>
-          <p:nvPr>
-            <p:ph idx="1"/>
-          </p:nvPr>
-        </p:nvSpPr>
-        <p:spPr>
-          <a:xfrm>
-            <a:off x="7865806" y="2251587"/>
-            <a:ext cx="3706762" cy="3972232"/>
-          </a:xfrm>
-        </p:spPr>
-        <p:txBody>
-          <a:bodyPr>
-            <a:normAutofit/>
-          </a:bodyPr>
-          <a:lstStyle/>
-          <a:p>
-            <a:r>
-              <a:rPr lang="en-US" dirty="0"/>
-              <a:t>We must parse user input for numbers and special characters, only accepting lowercase and uppercase letters</a:t>
-            </a:r>
-          </a:p>
-          <a:p>
-            <a:r>
-              <a:rPr lang="en-US" dirty="0"/>
-              <a:t>A good algorithm will ignore these parameters without adding them to the list or breaking the program </a:t>
-            </a:r>
-          </a:p>
-        </p:txBody>
-      </p:sp>
-    </p:spTree>
-    <p:extLst>
-      <p:ext uri="{BB962C8B-B14F-4D97-AF65-F5344CB8AC3E}">
-        <p14:creationId xmlns:p14="http://schemas.microsoft.com/office/powerpoint/2010/main" val="2913628061"/>
-      </p:ext>
-    </p:extLst>
-  </p:cSld>
-  <p:clrMapOvr>
-    <a:masterClrMapping/>
-  </p:clrMapOvr>
-</p:sld>
-</file>
-
-<file path=ppt/slides/slide6.xml><?xml version="1.0" encoding="utf-8"?>
-<p:sld xmlns:a="http://schemas.openxmlformats.org/drawingml/2006/main" xmlns:r="http://schemas.openxmlformats.org/officeDocument/2006/relationships" xmlns:p="http://schemas.openxmlformats.org/presentationml/2006/main">
-  <p:cSld>
-    <p:spTree>
-      <p:nvGrpSpPr>
-        <p:cNvPr id="1" name=""/>
-        <p:cNvGrpSpPr/>
-        <p:nvPr/>
-      </p:nvGrpSpPr>
-      <p:grpSpPr>
-        <a:xfrm>
-          <a:off x="0" y="0"/>
-          <a:ext cx="0" cy="0"/>
-          <a:chOff x="0" y="0"/>
-          <a:chExt cx="0" cy="0"/>
-        </a:xfrm>
-      </p:grpSpPr>
-      <p:sp>
-        <p:nvSpPr>
-          <p:cNvPr id="2" name="Title 1">
-            <a:extLst>
-              <a:ext uri="{FF2B5EF4-FFF2-40B4-BE49-F238E27FC236}">
-                <a16:creationId xmlns:a16="http://schemas.microsoft.com/office/drawing/2014/main" id="{7E901C9F-B39A-4BC2-AF24-AC68F3EA9B0D}"/>
-              </a:ext>
-            </a:extLst>
-          </p:cNvPr>
-          <p:cNvSpPr>
-            <a:spLocks noGrp="1"/>
-          </p:cNvSpPr>
-          <p:nvPr>
-            <p:ph type="title"/>
-          </p:nvPr>
-        </p:nvSpPr>
-        <p:spPr/>
-        <p:txBody>
-          <a:bodyPr/>
-          <a:lstStyle/>
-          <a:p>
-            <a:pPr algn="ctr"/>
-            <a:r>
-              <a:rPr lang="en-US" dirty="0"/>
-              <a:t>Appending a linked list</a:t>
-            </a:r>
-          </a:p>
-        </p:txBody>
-      </p:sp>
-      <p:pic>
-        <p:nvPicPr>
-          <p:cNvPr id="5" name="Content Placeholder 4">
-            <a:extLst>
-              <a:ext uri="{FF2B5EF4-FFF2-40B4-BE49-F238E27FC236}">
-                <a16:creationId xmlns:a16="http://schemas.microsoft.com/office/drawing/2014/main" id="{B1E8DE35-21EC-4E31-8F68-577998B40104}"/>
-              </a:ext>
-            </a:extLst>
-          </p:cNvPr>
-          <p:cNvPicPr>
-            <a:picLocks noGrp="1" noChangeAspect="1"/>
-          </p:cNvPicPr>
-          <p:nvPr>
-            <p:ph idx="1"/>
-          </p:nvPr>
-        </p:nvPicPr>
-        <p:blipFill>
-          <a:blip r:embed="rId2"/>
-          <a:stretch>
-            <a:fillRect/>
-          </a:stretch>
-        </p:blipFill>
-        <p:spPr>
-          <a:xfrm>
-            <a:off x="313861" y="2668060"/>
-            <a:ext cx="11564278" cy="3671780"/>
-          </a:xfrm>
-        </p:spPr>
-      </p:pic>
-      <p:sp>
-        <p:nvSpPr>
-          <p:cNvPr id="6" name="Rectangle 5">
-            <a:extLst>
-              <a:ext uri="{FF2B5EF4-FFF2-40B4-BE49-F238E27FC236}">
-                <a16:creationId xmlns:a16="http://schemas.microsoft.com/office/drawing/2014/main" id="{0BCE457B-BA09-4249-B921-838D5F495A42}"/>
-              </a:ext>
-            </a:extLst>
-          </p:cNvPr>
-          <p:cNvSpPr/>
-          <p:nvPr/>
-        </p:nvSpPr>
-        <p:spPr>
-          <a:xfrm>
-            <a:off x="6032390" y="4314909"/>
-            <a:ext cx="2356237" cy="1057523"/>
-          </a:xfrm>
-          <a:prstGeom prst="rect">
-            <a:avLst/>
-          </a:prstGeom>
-          <a:solidFill>
-            <a:schemeClr val="tx1"/>
-          </a:solidFill>
-          <a:ln>
-            <a:solidFill>
-              <a:schemeClr val="tx1"/>
-            </a:solidFill>
-          </a:ln>
-        </p:spPr>
-        <p:style>
-          <a:lnRef idx="2">
-            <a:schemeClr val="accent1">
-              <a:shade val="50000"/>
-            </a:schemeClr>
-          </a:lnRef>
-          <a:fillRef idx="1">
-            <a:schemeClr val="accent1"/>
-          </a:fillRef>
-          <a:effectRef idx="0">
-            <a:schemeClr val="accent1"/>
-          </a:effectRef>
-          <a:fontRef idx="minor">
-            <a:schemeClr val="lt1"/>
-          </a:fontRef>
-        </p:style>
-        <p:txBody>
-          <a:bodyPr rtlCol="0" anchor="ctr"/>
-          <a:lstStyle/>
-          <a:p>
-            <a:pPr algn="ctr"/>
-            <a:endParaRPr lang="en-US"/>
-          </a:p>
-        </p:txBody>
-      </p:sp>
-    </p:spTree>
-    <p:extLst>
-      <p:ext uri="{BB962C8B-B14F-4D97-AF65-F5344CB8AC3E}">
-        <p14:creationId xmlns:p14="http://schemas.microsoft.com/office/powerpoint/2010/main" val="2945634871"/>
-      </p:ext>
-    </p:extLst>
-  </p:cSld>
-  <p:clrMapOvr>
-    <a:masterClrMapping/>
-  </p:clrMapOvr>
-</p:sld>
-</file>
-
-<file path=ppt/slides/slide7.xml><?xml version="1.0" encoding="utf-8"?>
-<p:sld xmlns:a="http://schemas.openxmlformats.org/drawingml/2006/main" xmlns:r="http://schemas.openxmlformats.org/officeDocument/2006/relationships" xmlns:p="http://schemas.openxmlformats.org/presentationml/2006/main">
-  <p:cSld>
     <p:bg>
       <p:bgPr>
         <a:blipFill>
@@ -9670,7 +8735,7 @@
 </p:sld>
 </file>
 
-<file path=ppt/slides/slide8.xml><?xml version="1.0" encoding="utf-8"?>
+<file path=ppt/slides/slide11.xml><?xml version="1.0" encoding="utf-8"?>
 <p:sld xmlns:a="http://schemas.openxmlformats.org/drawingml/2006/main" xmlns:r="http://schemas.openxmlformats.org/officeDocument/2006/relationships" xmlns:p="http://schemas.openxmlformats.org/presentationml/2006/main">
   <p:cSld>
     <p:bg>
@@ -10103,7 +9168,7 @@
 </p:sld>
 </file>
 
-<file path=ppt/slides/slide9.xml><?xml version="1.0" encoding="utf-8"?>
+<file path=ppt/slides/slide12.xml><?xml version="1.0" encoding="utf-8"?>
 <p:sld xmlns:a="http://schemas.openxmlformats.org/drawingml/2006/main" xmlns:r="http://schemas.openxmlformats.org/officeDocument/2006/relationships" xmlns:p="http://schemas.openxmlformats.org/presentationml/2006/main">
   <p:cSld>
     <p:spTree>
@@ -10258,6 +9323,1543 @@
     <p:extLst>
       <p:ext uri="{BB962C8B-B14F-4D97-AF65-F5344CB8AC3E}">
         <p14:creationId xmlns:p14="http://schemas.microsoft.com/office/powerpoint/2010/main" val="2943988881"/>
+      </p:ext>
+    </p:extLst>
+  </p:cSld>
+  <p:clrMapOvr>
+    <a:masterClrMapping/>
+  </p:clrMapOvr>
+</p:sld>
+</file>
+
+<file path=ppt/slides/slide13.xml><?xml version="1.0" encoding="utf-8"?>
+<p:sld xmlns:a="http://schemas.openxmlformats.org/drawingml/2006/main" xmlns:r="http://schemas.openxmlformats.org/officeDocument/2006/relationships" xmlns:p="http://schemas.openxmlformats.org/presentationml/2006/main">
+  <p:cSld>
+    <p:spTree>
+      <p:nvGrpSpPr>
+        <p:cNvPr id="1" name=""/>
+        <p:cNvGrpSpPr/>
+        <p:nvPr/>
+      </p:nvGrpSpPr>
+      <p:grpSpPr>
+        <a:xfrm>
+          <a:off x="0" y="0"/>
+          <a:ext cx="0" cy="0"/>
+          <a:chOff x="0" y="0"/>
+          <a:chExt cx="0" cy="0"/>
+        </a:xfrm>
+      </p:grpSpPr>
+      <p:sp>
+        <p:nvSpPr>
+          <p:cNvPr id="2" name="Title 1">
+            <a:extLst>
+              <a:ext uri="{FF2B5EF4-FFF2-40B4-BE49-F238E27FC236}">
+                <a16:creationId xmlns:a16="http://schemas.microsoft.com/office/drawing/2014/main" id="{8319EC3C-0EDE-42E7-B279-4F8B4475E1CF}"/>
+              </a:ext>
+            </a:extLst>
+          </p:cNvPr>
+          <p:cNvSpPr>
+            <a:spLocks noGrp="1"/>
+          </p:cNvSpPr>
+          <p:nvPr>
+            <p:ph type="title"/>
+          </p:nvPr>
+        </p:nvSpPr>
+        <p:spPr>
+          <a:xfrm>
+            <a:off x="1030287" y="635726"/>
+            <a:ext cx="10131425" cy="1456267"/>
+          </a:xfrm>
+        </p:spPr>
+        <p:txBody>
+          <a:bodyPr/>
+          <a:lstStyle/>
+          <a:p>
+            <a:pPr algn="ctr"/>
+            <a:r>
+              <a:rPr lang="en-US" dirty="0"/>
+              <a:t>Caesar cipher</a:t>
+            </a:r>
+          </a:p>
+        </p:txBody>
+      </p:sp>
+      <p:sp>
+        <p:nvSpPr>
+          <p:cNvPr id="6" name="TextBox 5">
+            <a:extLst>
+              <a:ext uri="{FF2B5EF4-FFF2-40B4-BE49-F238E27FC236}">
+                <a16:creationId xmlns:a16="http://schemas.microsoft.com/office/drawing/2014/main" id="{67F9E4E2-F0EF-47ED-A7E6-EEE76285E3FB}"/>
+              </a:ext>
+            </a:extLst>
+          </p:cNvPr>
+          <p:cNvSpPr txBox="1"/>
+          <p:nvPr/>
+        </p:nvSpPr>
+        <p:spPr>
+          <a:xfrm>
+            <a:off x="1293222" y="2091993"/>
+            <a:ext cx="9605554" cy="523220"/>
+          </a:xfrm>
+          <a:prstGeom prst="rect">
+            <a:avLst/>
+          </a:prstGeom>
+          <a:noFill/>
+        </p:spPr>
+        <p:txBody>
+          <a:bodyPr wrap="square" rtlCol="0">
+            <a:spAutoFit/>
+          </a:bodyPr>
+          <a:lstStyle/>
+          <a:p>
+            <a:pPr algn="ctr"/>
+            <a:r>
+              <a:rPr lang="en-US" sz="2800" dirty="0"/>
+              <a:t>Final result with letter shift of five (5).</a:t>
+            </a:r>
+          </a:p>
+        </p:txBody>
+      </p:sp>
+      <p:pic>
+        <p:nvPicPr>
+          <p:cNvPr id="10" name="Content Placeholder 9">
+            <a:extLst>
+              <a:ext uri="{FF2B5EF4-FFF2-40B4-BE49-F238E27FC236}">
+                <a16:creationId xmlns:a16="http://schemas.microsoft.com/office/drawing/2014/main" id="{BF3075F7-927F-4B61-9A0D-7CF3DF11BE86}"/>
+              </a:ext>
+            </a:extLst>
+          </p:cNvPr>
+          <p:cNvPicPr>
+            <a:picLocks noGrp="1" noChangeAspect="1"/>
+          </p:cNvPicPr>
+          <p:nvPr>
+            <p:ph idx="1"/>
+          </p:nvPr>
+        </p:nvPicPr>
+        <p:blipFill>
+          <a:blip r:embed="rId2"/>
+          <a:stretch>
+            <a:fillRect/>
+          </a:stretch>
+        </p:blipFill>
+        <p:spPr>
+          <a:xfrm>
+            <a:off x="183312" y="2858403"/>
+            <a:ext cx="11825374" cy="2662832"/>
+          </a:xfrm>
+        </p:spPr>
+      </p:pic>
+    </p:spTree>
+    <p:extLst>
+      <p:ext uri="{BB962C8B-B14F-4D97-AF65-F5344CB8AC3E}">
+        <p14:creationId xmlns:p14="http://schemas.microsoft.com/office/powerpoint/2010/main" val="2119457388"/>
+      </p:ext>
+    </p:extLst>
+  </p:cSld>
+  <p:clrMapOvr>
+    <a:masterClrMapping/>
+  </p:clrMapOvr>
+</p:sld>
+</file>
+
+<file path=ppt/slides/slide14.xml><?xml version="1.0" encoding="utf-8"?>
+<p:sld xmlns:a="http://schemas.openxmlformats.org/drawingml/2006/main" xmlns:r="http://schemas.openxmlformats.org/officeDocument/2006/relationships" xmlns:p="http://schemas.openxmlformats.org/presentationml/2006/main">
+  <p:cSld>
+    <p:spTree>
+      <p:nvGrpSpPr>
+        <p:cNvPr id="1" name=""/>
+        <p:cNvGrpSpPr/>
+        <p:nvPr/>
+      </p:nvGrpSpPr>
+      <p:grpSpPr>
+        <a:xfrm>
+          <a:off x="0" y="0"/>
+          <a:ext cx="0" cy="0"/>
+          <a:chOff x="0" y="0"/>
+          <a:chExt cx="0" cy="0"/>
+        </a:xfrm>
+      </p:grpSpPr>
+      <p:sp>
+        <p:nvSpPr>
+          <p:cNvPr id="2" name="Title 1">
+            <a:extLst>
+              <a:ext uri="{FF2B5EF4-FFF2-40B4-BE49-F238E27FC236}">
+                <a16:creationId xmlns:a16="http://schemas.microsoft.com/office/drawing/2014/main" id="{F7F8F481-A898-408E-AF04-54EC8A03D37E}"/>
+              </a:ext>
+            </a:extLst>
+          </p:cNvPr>
+          <p:cNvSpPr>
+            <a:spLocks noGrp="1"/>
+          </p:cNvSpPr>
+          <p:nvPr>
+            <p:ph type="title"/>
+          </p:nvPr>
+        </p:nvSpPr>
+        <p:spPr/>
+        <p:txBody>
+          <a:bodyPr/>
+          <a:lstStyle/>
+          <a:p>
+            <a:pPr algn="ctr"/>
+            <a:r>
+              <a:rPr lang="en-US" dirty="0"/>
+              <a:t>Final notes</a:t>
+            </a:r>
+          </a:p>
+        </p:txBody>
+      </p:sp>
+      <p:sp>
+        <p:nvSpPr>
+          <p:cNvPr id="3" name="Content Placeholder 2">
+            <a:extLst>
+              <a:ext uri="{FF2B5EF4-FFF2-40B4-BE49-F238E27FC236}">
+                <a16:creationId xmlns:a16="http://schemas.microsoft.com/office/drawing/2014/main" id="{5321E345-5275-44C5-B127-E6FD1737941E}"/>
+              </a:ext>
+            </a:extLst>
+          </p:cNvPr>
+          <p:cNvSpPr>
+            <a:spLocks noGrp="1"/>
+          </p:cNvSpPr>
+          <p:nvPr>
+            <p:ph idx="1"/>
+          </p:nvPr>
+        </p:nvSpPr>
+        <p:spPr/>
+        <p:txBody>
+          <a:bodyPr>
+            <a:normAutofit/>
+          </a:bodyPr>
+          <a:lstStyle/>
+          <a:p>
+            <a:r>
+              <a:rPr lang="en-US" sz="3600" dirty="0"/>
+              <a:t>All non-letters are replaced with whitespace through a </a:t>
+            </a:r>
+            <a:r>
+              <a:rPr lang="en-US" sz="3600" i="1" dirty="0"/>
+              <a:t>regex</a:t>
+            </a:r>
+            <a:r>
+              <a:rPr lang="en-US" sz="3600" dirty="0"/>
+              <a:t> expression below.</a:t>
+            </a:r>
+          </a:p>
+          <a:p>
+            <a:r>
+              <a:rPr lang="en-US" sz="3200" b="1" dirty="0"/>
+              <a:t>String str = </a:t>
+            </a:r>
+            <a:r>
+              <a:rPr lang="en-US" sz="3200" b="1" i="1" dirty="0" err="1"/>
+              <a:t>text.replaceAll</a:t>
+            </a:r>
+            <a:r>
+              <a:rPr lang="en-US" sz="3200" b="1" i="1" dirty="0"/>
+              <a:t>("[^\\p{</a:t>
+            </a:r>
+            <a:r>
+              <a:rPr lang="en-US" sz="3200" b="1" i="1" dirty="0" err="1"/>
+              <a:t>Alnum</a:t>
+            </a:r>
+            <a:r>
+              <a:rPr lang="en-US" sz="3200" b="1" i="1" dirty="0"/>
+              <a:t>}]+", " ");</a:t>
+            </a:r>
+            <a:endParaRPr lang="en-US" sz="3200" dirty="0"/>
+          </a:p>
+        </p:txBody>
+      </p:sp>
+    </p:spTree>
+    <p:extLst>
+      <p:ext uri="{BB962C8B-B14F-4D97-AF65-F5344CB8AC3E}">
+        <p14:creationId xmlns:p14="http://schemas.microsoft.com/office/powerpoint/2010/main" val="252575413"/>
+      </p:ext>
+    </p:extLst>
+  </p:cSld>
+  <p:clrMapOvr>
+    <a:masterClrMapping/>
+  </p:clrMapOvr>
+</p:sld>
+</file>
+
+<file path=ppt/slides/slide2.xml><?xml version="1.0" encoding="utf-8"?>
+<p:sld xmlns:a="http://schemas.openxmlformats.org/drawingml/2006/main" xmlns:r="http://schemas.openxmlformats.org/officeDocument/2006/relationships" xmlns:p="http://schemas.openxmlformats.org/presentationml/2006/main">
+  <p:cSld>
+    <p:spTree>
+      <p:nvGrpSpPr>
+        <p:cNvPr id="1" name=""/>
+        <p:cNvGrpSpPr/>
+        <p:nvPr/>
+      </p:nvGrpSpPr>
+      <p:grpSpPr>
+        <a:xfrm>
+          <a:off x="0" y="0"/>
+          <a:ext cx="0" cy="0"/>
+          <a:chOff x="0" y="0"/>
+          <a:chExt cx="0" cy="0"/>
+        </a:xfrm>
+      </p:grpSpPr>
+      <p:sp>
+        <p:nvSpPr>
+          <p:cNvPr id="2" name="Title 1">
+            <a:extLst>
+              <a:ext uri="{FF2B5EF4-FFF2-40B4-BE49-F238E27FC236}">
+                <a16:creationId xmlns:a16="http://schemas.microsoft.com/office/drawing/2014/main" id="{17CEDFC3-507A-4282-BE64-EF771D1A5723}"/>
+              </a:ext>
+            </a:extLst>
+          </p:cNvPr>
+          <p:cNvSpPr>
+            <a:spLocks noGrp="1"/>
+          </p:cNvSpPr>
+          <p:nvPr>
+            <p:ph type="title"/>
+          </p:nvPr>
+        </p:nvSpPr>
+        <p:spPr>
+          <a:xfrm>
+            <a:off x="685800" y="171848"/>
+            <a:ext cx="10131425" cy="1456267"/>
+          </a:xfrm>
+        </p:spPr>
+        <p:txBody>
+          <a:bodyPr/>
+          <a:lstStyle/>
+          <a:p>
+            <a:pPr algn="ctr"/>
+            <a:r>
+              <a:rPr lang="en-US" dirty="0"/>
+              <a:t>How to code a Caesar cipher</a:t>
+            </a:r>
+          </a:p>
+        </p:txBody>
+      </p:sp>
+      <p:pic>
+        <p:nvPicPr>
+          <p:cNvPr id="5" name="Content Placeholder 4">
+            <a:extLst>
+              <a:ext uri="{FF2B5EF4-FFF2-40B4-BE49-F238E27FC236}">
+                <a16:creationId xmlns:a16="http://schemas.microsoft.com/office/drawing/2014/main" id="{B643E8C6-B49E-4D95-A0BE-4D44FE53C05D}"/>
+              </a:ext>
+            </a:extLst>
+          </p:cNvPr>
+          <p:cNvPicPr>
+            <a:picLocks noGrp="1" noChangeAspect="1"/>
+          </p:cNvPicPr>
+          <p:nvPr>
+            <p:ph idx="1"/>
+          </p:nvPr>
+        </p:nvPicPr>
+        <p:blipFill>
+          <a:blip r:embed="rId2"/>
+          <a:stretch>
+            <a:fillRect/>
+          </a:stretch>
+        </p:blipFill>
+        <p:spPr>
+          <a:xfrm>
+            <a:off x="821069" y="1497874"/>
+            <a:ext cx="10549862" cy="5188278"/>
+          </a:xfrm>
+        </p:spPr>
+      </p:pic>
+    </p:spTree>
+    <p:extLst>
+      <p:ext uri="{BB962C8B-B14F-4D97-AF65-F5344CB8AC3E}">
+        <p14:creationId xmlns:p14="http://schemas.microsoft.com/office/powerpoint/2010/main" val="4165465711"/>
+      </p:ext>
+    </p:extLst>
+  </p:cSld>
+  <p:clrMapOvr>
+    <a:masterClrMapping/>
+  </p:clrMapOvr>
+</p:sld>
+</file>
+
+<file path=ppt/slides/slide3.xml><?xml version="1.0" encoding="utf-8"?>
+<p:sld xmlns:a="http://schemas.openxmlformats.org/drawingml/2006/main" xmlns:r="http://schemas.openxmlformats.org/officeDocument/2006/relationships" xmlns:p="http://schemas.openxmlformats.org/presentationml/2006/main">
+  <p:cSld>
+    <p:spTree>
+      <p:nvGrpSpPr>
+        <p:cNvPr id="1" name=""/>
+        <p:cNvGrpSpPr/>
+        <p:nvPr/>
+      </p:nvGrpSpPr>
+      <p:grpSpPr>
+        <a:xfrm>
+          <a:off x="0" y="0"/>
+          <a:ext cx="0" cy="0"/>
+          <a:chOff x="0" y="0"/>
+          <a:chExt cx="0" cy="0"/>
+        </a:xfrm>
+      </p:grpSpPr>
+      <p:sp>
+        <p:nvSpPr>
+          <p:cNvPr id="2" name="Title 1">
+            <a:extLst>
+              <a:ext uri="{FF2B5EF4-FFF2-40B4-BE49-F238E27FC236}">
+                <a16:creationId xmlns:a16="http://schemas.microsoft.com/office/drawing/2014/main" id="{178072B4-2BEB-4869-9BAF-9CEE70941B10}"/>
+              </a:ext>
+            </a:extLst>
+          </p:cNvPr>
+          <p:cNvSpPr>
+            <a:spLocks noGrp="1"/>
+          </p:cNvSpPr>
+          <p:nvPr>
+            <p:ph type="title"/>
+          </p:nvPr>
+        </p:nvSpPr>
+        <p:spPr/>
+        <p:txBody>
+          <a:bodyPr/>
+          <a:lstStyle/>
+          <a:p>
+            <a:pPr algn="ctr"/>
+            <a:r>
+              <a:rPr lang="en-US" dirty="0"/>
+              <a:t>Caesar cipher example</a:t>
+            </a:r>
+          </a:p>
+        </p:txBody>
+      </p:sp>
+      <p:sp>
+        <p:nvSpPr>
+          <p:cNvPr id="3" name="Content Placeholder 2">
+            <a:extLst>
+              <a:ext uri="{FF2B5EF4-FFF2-40B4-BE49-F238E27FC236}">
+                <a16:creationId xmlns:a16="http://schemas.microsoft.com/office/drawing/2014/main" id="{D07E37D1-F61D-4F72-BA9F-014562611F66}"/>
+              </a:ext>
+            </a:extLst>
+          </p:cNvPr>
+          <p:cNvSpPr>
+            <a:spLocks noGrp="1"/>
+          </p:cNvSpPr>
+          <p:nvPr>
+            <p:ph idx="1"/>
+          </p:nvPr>
+        </p:nvSpPr>
+        <p:spPr/>
+        <p:txBody>
+          <a:bodyPr>
+            <a:normAutofit/>
+          </a:bodyPr>
+          <a:lstStyle/>
+          <a:p>
+            <a:r>
+              <a:rPr lang="en-US" sz="4000" dirty="0"/>
+              <a:t>Rule = add 2</a:t>
+            </a:r>
+          </a:p>
+          <a:p>
+            <a:r>
+              <a:rPr lang="en-US" sz="4000" dirty="0"/>
+              <a:t>Input = A</a:t>
+            </a:r>
+          </a:p>
+          <a:p>
+            <a:r>
+              <a:rPr lang="en-US" sz="4000" dirty="0"/>
+              <a:t>Encryption = C</a:t>
+            </a:r>
+          </a:p>
+          <a:p>
+            <a:r>
+              <a:rPr lang="en-US" sz="4000" dirty="0"/>
+              <a:t>Decryption = A</a:t>
+            </a:r>
+          </a:p>
+        </p:txBody>
+      </p:sp>
+    </p:spTree>
+    <p:extLst>
+      <p:ext uri="{BB962C8B-B14F-4D97-AF65-F5344CB8AC3E}">
+        <p14:creationId xmlns:p14="http://schemas.microsoft.com/office/powerpoint/2010/main" val="3850978264"/>
+      </p:ext>
+    </p:extLst>
+  </p:cSld>
+  <p:clrMapOvr>
+    <a:masterClrMapping/>
+  </p:clrMapOvr>
+</p:sld>
+</file>
+
+<file path=ppt/slides/slide4.xml><?xml version="1.0" encoding="utf-8"?>
+<p:sld xmlns:a="http://schemas.openxmlformats.org/drawingml/2006/main" xmlns:r="http://schemas.openxmlformats.org/officeDocument/2006/relationships" xmlns:p="http://schemas.openxmlformats.org/presentationml/2006/main">
+  <p:cSld>
+    <p:bg>
+      <p:bgPr>
+        <a:blipFill>
+          <a:blip r:embed="rId2">
+            <a:extLst/>
+          </a:blip>
+          <a:stretch/>
+        </a:blipFill>
+        <a:effectLst/>
+      </p:bgPr>
+    </p:bg>
+    <p:spTree>
+      <p:nvGrpSpPr>
+        <p:cNvPr id="1" name=""/>
+        <p:cNvGrpSpPr/>
+        <p:nvPr/>
+      </p:nvGrpSpPr>
+      <p:grpSpPr>
+        <a:xfrm>
+          <a:off x="0" y="0"/>
+          <a:ext cx="0" cy="0"/>
+          <a:chOff x="0" y="0"/>
+          <a:chExt cx="0" cy="0"/>
+        </a:xfrm>
+      </p:grpSpPr>
+      <p:sp>
+        <p:nvSpPr>
+          <p:cNvPr id="2" name="Title 1">
+            <a:extLst>
+              <a:ext uri="{FF2B5EF4-FFF2-40B4-BE49-F238E27FC236}">
+                <a16:creationId xmlns:a16="http://schemas.microsoft.com/office/drawing/2014/main" id="{9A424015-EA10-4326-89DE-141E2889EDE9}"/>
+              </a:ext>
+            </a:extLst>
+          </p:cNvPr>
+          <p:cNvSpPr>
+            <a:spLocks noGrp="1"/>
+          </p:cNvSpPr>
+          <p:nvPr>
+            <p:ph type="title"/>
+          </p:nvPr>
+        </p:nvSpPr>
+        <p:spPr>
+          <a:xfrm>
+            <a:off x="7865806" y="643463"/>
+            <a:ext cx="3706762" cy="1608124"/>
+          </a:xfrm>
+        </p:spPr>
+        <p:txBody>
+          <a:bodyPr>
+            <a:normAutofit fontScale="90000"/>
+          </a:bodyPr>
+          <a:lstStyle/>
+          <a:p>
+            <a:r>
+              <a:rPr lang="en-US" dirty="0"/>
+              <a:t>How to initialize a linked list</a:t>
+            </a:r>
+          </a:p>
+        </p:txBody>
+      </p:sp>
+      <p:sp>
+        <p:nvSpPr>
+          <p:cNvPr id="10" name="Content Placeholder 9">
+            <a:extLst>
+              <a:ext uri="{FF2B5EF4-FFF2-40B4-BE49-F238E27FC236}">
+                <a16:creationId xmlns:a16="http://schemas.microsoft.com/office/drawing/2014/main" id="{352D05EE-812C-4591-B656-A00B179C86DA}"/>
+              </a:ext>
+            </a:extLst>
+          </p:cNvPr>
+          <p:cNvSpPr>
+            <a:spLocks noGrp="1"/>
+          </p:cNvSpPr>
+          <p:nvPr>
+            <p:ph idx="1"/>
+          </p:nvPr>
+        </p:nvSpPr>
+        <p:spPr>
+          <a:xfrm>
+            <a:off x="7865806" y="2251587"/>
+            <a:ext cx="3706762" cy="3972232"/>
+          </a:xfrm>
+        </p:spPr>
+        <p:txBody>
+          <a:bodyPr>
+            <a:normAutofit/>
+          </a:bodyPr>
+          <a:lstStyle/>
+          <a:p>
+            <a:r>
+              <a:rPr lang="en-US" dirty="0"/>
+              <a:t>Node is its own class because it is a Noun/thing.</a:t>
+            </a:r>
+          </a:p>
+          <a:p>
+            <a:r>
+              <a:rPr lang="en-US" dirty="0"/>
+              <a:t>Verbs/actions that a Noun does, would be its methods.</a:t>
+            </a:r>
+          </a:p>
+          <a:p>
+            <a:r>
+              <a:rPr lang="en-US" dirty="0"/>
+              <a:t>In our project, Node and LinkedList are classes, while encryption/decryption are methods.</a:t>
+            </a:r>
+          </a:p>
+        </p:txBody>
+      </p:sp>
+      <p:pic>
+        <p:nvPicPr>
+          <p:cNvPr id="4" name="Picture 3">
+            <a:extLst>
+              <a:ext uri="{FF2B5EF4-FFF2-40B4-BE49-F238E27FC236}">
+                <a16:creationId xmlns:a16="http://schemas.microsoft.com/office/drawing/2014/main" id="{5C728E63-BBAB-4DCC-9467-DFA7387F5B65}"/>
+              </a:ext>
+            </a:extLst>
+          </p:cNvPr>
+          <p:cNvPicPr>
+            <a:picLocks noChangeAspect="1"/>
+          </p:cNvPicPr>
+          <p:nvPr/>
+        </p:nvPicPr>
+        <p:blipFill>
+          <a:blip r:embed="rId3"/>
+          <a:stretch>
+            <a:fillRect/>
+          </a:stretch>
+        </p:blipFill>
+        <p:spPr>
+          <a:xfrm>
+            <a:off x="319284" y="822764"/>
+            <a:ext cx="7228066" cy="2469076"/>
+          </a:xfrm>
+          <a:prstGeom prst="rect">
+            <a:avLst/>
+          </a:prstGeom>
+        </p:spPr>
+      </p:pic>
+      <p:pic>
+        <p:nvPicPr>
+          <p:cNvPr id="6" name="Picture 5">
+            <a:extLst>
+              <a:ext uri="{FF2B5EF4-FFF2-40B4-BE49-F238E27FC236}">
+                <a16:creationId xmlns:a16="http://schemas.microsoft.com/office/drawing/2014/main" id="{DD0A55D6-98D4-4B7F-80D6-4BB0FAE69D5E}"/>
+              </a:ext>
+            </a:extLst>
+          </p:cNvPr>
+          <p:cNvPicPr>
+            <a:picLocks noChangeAspect="1"/>
+          </p:cNvPicPr>
+          <p:nvPr/>
+        </p:nvPicPr>
+        <p:blipFill>
+          <a:blip r:embed="rId4"/>
+          <a:stretch>
+            <a:fillRect/>
+          </a:stretch>
+        </p:blipFill>
+        <p:spPr>
+          <a:xfrm>
+            <a:off x="319284" y="3291840"/>
+            <a:ext cx="7228066" cy="2204720"/>
+          </a:xfrm>
+          <a:prstGeom prst="rect">
+            <a:avLst/>
+          </a:prstGeom>
+        </p:spPr>
+      </p:pic>
+    </p:spTree>
+    <p:extLst>
+      <p:ext uri="{BB962C8B-B14F-4D97-AF65-F5344CB8AC3E}">
+        <p14:creationId xmlns:p14="http://schemas.microsoft.com/office/powerpoint/2010/main" val="695976237"/>
+      </p:ext>
+    </p:extLst>
+  </p:cSld>
+  <p:clrMapOvr>
+    <a:masterClrMapping/>
+  </p:clrMapOvr>
+</p:sld>
+</file>
+
+<file path=ppt/slides/slide5.xml><?xml version="1.0" encoding="utf-8"?>
+<p:sld xmlns:a="http://schemas.openxmlformats.org/drawingml/2006/main" xmlns:r="http://schemas.openxmlformats.org/officeDocument/2006/relationships" xmlns:p="http://schemas.openxmlformats.org/presentationml/2006/main">
+  <p:cSld>
+    <p:bg>
+      <p:bgPr>
+        <a:blipFill>
+          <a:blip r:embed="rId2">
+            <a:extLst/>
+          </a:blip>
+          <a:stretch/>
+        </a:blipFill>
+        <a:effectLst/>
+      </p:bgPr>
+    </p:bg>
+    <p:spTree>
+      <p:nvGrpSpPr>
+        <p:cNvPr id="1" name=""/>
+        <p:cNvGrpSpPr/>
+        <p:nvPr/>
+      </p:nvGrpSpPr>
+      <p:grpSpPr>
+        <a:xfrm>
+          <a:off x="0" y="0"/>
+          <a:ext cx="0" cy="0"/>
+          <a:chOff x="0" y="0"/>
+          <a:chExt cx="0" cy="0"/>
+        </a:xfrm>
+      </p:grpSpPr>
+      <p:sp>
+        <p:nvSpPr>
+          <p:cNvPr id="2" name="Title 1">
+            <a:extLst>
+              <a:ext uri="{FF2B5EF4-FFF2-40B4-BE49-F238E27FC236}">
+                <a16:creationId xmlns:a16="http://schemas.microsoft.com/office/drawing/2014/main" id="{2BD3BDA2-9820-423C-B414-C98F3DEE6A33}"/>
+              </a:ext>
+            </a:extLst>
+          </p:cNvPr>
+          <p:cNvSpPr>
+            <a:spLocks noGrp="1"/>
+          </p:cNvSpPr>
+          <p:nvPr>
+            <p:ph type="title"/>
+          </p:nvPr>
+        </p:nvSpPr>
+        <p:spPr>
+          <a:xfrm>
+            <a:off x="7865806" y="643463"/>
+            <a:ext cx="3706762" cy="1608124"/>
+          </a:xfrm>
+        </p:spPr>
+        <p:txBody>
+          <a:bodyPr>
+            <a:normAutofit/>
+          </a:bodyPr>
+          <a:lstStyle/>
+          <a:p>
+            <a:r>
+              <a:rPr lang="en-US" dirty="0"/>
+              <a:t>Appending a linked list</a:t>
+            </a:r>
+          </a:p>
+        </p:txBody>
+      </p:sp>
+      <p:pic>
+        <p:nvPicPr>
+          <p:cNvPr id="6" name="Picture 5">
+            <a:extLst>
+              <a:ext uri="{FF2B5EF4-FFF2-40B4-BE49-F238E27FC236}">
+                <a16:creationId xmlns:a16="http://schemas.microsoft.com/office/drawing/2014/main" id="{1AFBC86D-C4B6-43C0-BD86-98460354A5CE}"/>
+              </a:ext>
+            </a:extLst>
+          </p:cNvPr>
+          <p:cNvPicPr>
+            <a:picLocks noChangeAspect="1"/>
+          </p:cNvPicPr>
+          <p:nvPr/>
+        </p:nvPicPr>
+        <p:blipFill>
+          <a:blip r:embed="rId3"/>
+          <a:stretch>
+            <a:fillRect/>
+          </a:stretch>
+        </p:blipFill>
+        <p:spPr>
+          <a:xfrm>
+            <a:off x="246112" y="332330"/>
+            <a:ext cx="7522744" cy="6193339"/>
+          </a:xfrm>
+          <a:prstGeom prst="roundRect">
+            <a:avLst>
+              <a:gd name="adj" fmla="val 4380"/>
+            </a:avLst>
+          </a:prstGeom>
+          <a:ln w="50800" cap="sq" cmpd="dbl">
+            <a:gradFill flip="none" rotWithShape="1">
+              <a:gsLst>
+                <a:gs pos="0">
+                  <a:srgbClr val="FFFFFF"/>
+                </a:gs>
+                <a:gs pos="100000">
+                  <a:schemeClr val="tx1">
+                    <a:alpha val="0"/>
+                  </a:schemeClr>
+                </a:gs>
+              </a:gsLst>
+              <a:path path="circle">
+                <a:fillToRect l="50000" t="50000" r="50000" b="50000"/>
+              </a:path>
+              <a:tileRect/>
+            </a:gradFill>
+            <a:miter lim="800000"/>
+          </a:ln>
+          <a:effectLst>
+            <a:outerShdw blurRad="254000" algn="tl" rotWithShape="0">
+              <a:srgbClr val="000000">
+                <a:alpha val="43000"/>
+              </a:srgbClr>
+            </a:outerShdw>
+          </a:effectLst>
+        </p:spPr>
+      </p:pic>
+      <p:sp>
+        <p:nvSpPr>
+          <p:cNvPr id="10" name="Content Placeholder 9">
+            <a:extLst>
+              <a:ext uri="{FF2B5EF4-FFF2-40B4-BE49-F238E27FC236}">
+                <a16:creationId xmlns:a16="http://schemas.microsoft.com/office/drawing/2014/main" id="{86B2D5E2-E252-4EED-874A-36A8D802A898}"/>
+              </a:ext>
+            </a:extLst>
+          </p:cNvPr>
+          <p:cNvSpPr>
+            <a:spLocks noGrp="1"/>
+          </p:cNvSpPr>
+          <p:nvPr>
+            <p:ph idx="1"/>
+          </p:nvPr>
+        </p:nvSpPr>
+        <p:spPr>
+          <a:xfrm>
+            <a:off x="7865806" y="2251587"/>
+            <a:ext cx="3706762" cy="3972232"/>
+          </a:xfrm>
+        </p:spPr>
+        <p:txBody>
+          <a:bodyPr>
+            <a:normAutofit/>
+          </a:bodyPr>
+          <a:lstStyle/>
+          <a:p>
+            <a:r>
+              <a:rPr lang="en-US" dirty="0"/>
+              <a:t>We must parse user input for numbers and special characters, only accepting lowercase and uppercase letters</a:t>
+            </a:r>
+          </a:p>
+          <a:p>
+            <a:r>
+              <a:rPr lang="en-US" dirty="0"/>
+              <a:t>A good algorithm will ignore these parameters without adding them to the list or breaking the program </a:t>
+            </a:r>
+          </a:p>
+        </p:txBody>
+      </p:sp>
+    </p:spTree>
+    <p:extLst>
+      <p:ext uri="{BB962C8B-B14F-4D97-AF65-F5344CB8AC3E}">
+        <p14:creationId xmlns:p14="http://schemas.microsoft.com/office/powerpoint/2010/main" val="2913628061"/>
+      </p:ext>
+    </p:extLst>
+  </p:cSld>
+  <p:clrMapOvr>
+    <a:masterClrMapping/>
+  </p:clrMapOvr>
+</p:sld>
+</file>
+
+<file path=ppt/slides/slide6.xml><?xml version="1.0" encoding="utf-8"?>
+<p:sld xmlns:a="http://schemas.openxmlformats.org/drawingml/2006/main" xmlns:r="http://schemas.openxmlformats.org/officeDocument/2006/relationships" xmlns:p="http://schemas.openxmlformats.org/presentationml/2006/main">
+  <p:cSld>
+    <p:spTree>
+      <p:nvGrpSpPr>
+        <p:cNvPr id="1" name=""/>
+        <p:cNvGrpSpPr/>
+        <p:nvPr/>
+      </p:nvGrpSpPr>
+      <p:grpSpPr>
+        <a:xfrm>
+          <a:off x="0" y="0"/>
+          <a:ext cx="0" cy="0"/>
+          <a:chOff x="0" y="0"/>
+          <a:chExt cx="0" cy="0"/>
+        </a:xfrm>
+      </p:grpSpPr>
+      <p:sp>
+        <p:nvSpPr>
+          <p:cNvPr id="2" name="Title 1">
+            <a:extLst>
+              <a:ext uri="{FF2B5EF4-FFF2-40B4-BE49-F238E27FC236}">
+                <a16:creationId xmlns:a16="http://schemas.microsoft.com/office/drawing/2014/main" id="{7E901C9F-B39A-4BC2-AF24-AC68F3EA9B0D}"/>
+              </a:ext>
+            </a:extLst>
+          </p:cNvPr>
+          <p:cNvSpPr>
+            <a:spLocks noGrp="1"/>
+          </p:cNvSpPr>
+          <p:nvPr>
+            <p:ph type="title"/>
+          </p:nvPr>
+        </p:nvSpPr>
+        <p:spPr/>
+        <p:txBody>
+          <a:bodyPr/>
+          <a:lstStyle/>
+          <a:p>
+            <a:pPr algn="ctr"/>
+            <a:r>
+              <a:rPr lang="en-US" dirty="0"/>
+              <a:t>Appending a linked list</a:t>
+            </a:r>
+          </a:p>
+        </p:txBody>
+      </p:sp>
+      <p:pic>
+        <p:nvPicPr>
+          <p:cNvPr id="5" name="Content Placeholder 4">
+            <a:extLst>
+              <a:ext uri="{FF2B5EF4-FFF2-40B4-BE49-F238E27FC236}">
+                <a16:creationId xmlns:a16="http://schemas.microsoft.com/office/drawing/2014/main" id="{B1E8DE35-21EC-4E31-8F68-577998B40104}"/>
+              </a:ext>
+            </a:extLst>
+          </p:cNvPr>
+          <p:cNvPicPr>
+            <a:picLocks noGrp="1" noChangeAspect="1"/>
+          </p:cNvPicPr>
+          <p:nvPr>
+            <p:ph idx="1"/>
+          </p:nvPr>
+        </p:nvPicPr>
+        <p:blipFill>
+          <a:blip r:embed="rId2"/>
+          <a:stretch>
+            <a:fillRect/>
+          </a:stretch>
+        </p:blipFill>
+        <p:spPr>
+          <a:xfrm>
+            <a:off x="313861" y="2668060"/>
+            <a:ext cx="11564278" cy="3671780"/>
+          </a:xfrm>
+        </p:spPr>
+      </p:pic>
+      <p:sp>
+        <p:nvSpPr>
+          <p:cNvPr id="6" name="Rectangle 5">
+            <a:extLst>
+              <a:ext uri="{FF2B5EF4-FFF2-40B4-BE49-F238E27FC236}">
+                <a16:creationId xmlns:a16="http://schemas.microsoft.com/office/drawing/2014/main" id="{0BCE457B-BA09-4249-B921-838D5F495A42}"/>
+              </a:ext>
+            </a:extLst>
+          </p:cNvPr>
+          <p:cNvSpPr/>
+          <p:nvPr/>
+        </p:nvSpPr>
+        <p:spPr>
+          <a:xfrm>
+            <a:off x="6032390" y="4314909"/>
+            <a:ext cx="2356237" cy="1057523"/>
+          </a:xfrm>
+          <a:prstGeom prst="rect">
+            <a:avLst/>
+          </a:prstGeom>
+          <a:solidFill>
+            <a:schemeClr val="tx1"/>
+          </a:solidFill>
+          <a:ln>
+            <a:solidFill>
+              <a:schemeClr val="tx1"/>
+            </a:solidFill>
+          </a:ln>
+        </p:spPr>
+        <p:style>
+          <a:lnRef idx="2">
+            <a:schemeClr val="accent1">
+              <a:shade val="50000"/>
+            </a:schemeClr>
+          </a:lnRef>
+          <a:fillRef idx="1">
+            <a:schemeClr val="accent1"/>
+          </a:fillRef>
+          <a:effectRef idx="0">
+            <a:schemeClr val="accent1"/>
+          </a:effectRef>
+          <a:fontRef idx="minor">
+            <a:schemeClr val="lt1"/>
+          </a:fontRef>
+        </p:style>
+        <p:txBody>
+          <a:bodyPr rtlCol="0" anchor="ctr"/>
+          <a:lstStyle/>
+          <a:p>
+            <a:pPr algn="ctr"/>
+            <a:endParaRPr lang="en-US"/>
+          </a:p>
+        </p:txBody>
+      </p:sp>
+      <p:sp>
+        <p:nvSpPr>
+          <p:cNvPr id="3" name="Rectangle 2">
+            <a:extLst>
+              <a:ext uri="{FF2B5EF4-FFF2-40B4-BE49-F238E27FC236}">
+                <a16:creationId xmlns:a16="http://schemas.microsoft.com/office/drawing/2014/main" id="{4F6F785C-33D0-40D1-895B-53CE9BFCDE21}"/>
+              </a:ext>
+            </a:extLst>
+          </p:cNvPr>
+          <p:cNvSpPr/>
+          <p:nvPr/>
+        </p:nvSpPr>
+        <p:spPr>
+          <a:xfrm>
+            <a:off x="3500847" y="3065417"/>
+            <a:ext cx="8133805" cy="3082834"/>
+          </a:xfrm>
+          <a:prstGeom prst="rect">
+            <a:avLst/>
+          </a:prstGeom>
+          <a:solidFill>
+            <a:schemeClr val="tx1"/>
+          </a:solidFill>
+          <a:ln>
+            <a:solidFill>
+              <a:schemeClr val="tx1"/>
+            </a:solidFill>
+          </a:ln>
+        </p:spPr>
+        <p:style>
+          <a:lnRef idx="2">
+            <a:schemeClr val="accent1">
+              <a:shade val="50000"/>
+            </a:schemeClr>
+          </a:lnRef>
+          <a:fillRef idx="1">
+            <a:schemeClr val="accent1"/>
+          </a:fillRef>
+          <a:effectRef idx="0">
+            <a:schemeClr val="accent1"/>
+          </a:effectRef>
+          <a:fontRef idx="minor">
+            <a:schemeClr val="lt1"/>
+          </a:fontRef>
+        </p:style>
+        <p:txBody>
+          <a:bodyPr rtlCol="0" anchor="ctr"/>
+          <a:lstStyle/>
+          <a:p>
+            <a:pPr algn="ctr"/>
+            <a:endParaRPr lang="en-US"/>
+          </a:p>
+        </p:txBody>
+      </p:sp>
+    </p:spTree>
+    <p:extLst>
+      <p:ext uri="{BB962C8B-B14F-4D97-AF65-F5344CB8AC3E}">
+        <p14:creationId xmlns:p14="http://schemas.microsoft.com/office/powerpoint/2010/main" val="2945634871"/>
+      </p:ext>
+    </p:extLst>
+  </p:cSld>
+  <p:clrMapOvr>
+    <a:masterClrMapping/>
+  </p:clrMapOvr>
+</p:sld>
+</file>
+
+<file path=ppt/slides/slide7.xml><?xml version="1.0" encoding="utf-8"?>
+<p:sld xmlns:a="http://schemas.openxmlformats.org/drawingml/2006/main" xmlns:r="http://schemas.openxmlformats.org/officeDocument/2006/relationships" xmlns:p="http://schemas.openxmlformats.org/presentationml/2006/main">
+  <p:cSld>
+    <p:spTree>
+      <p:nvGrpSpPr>
+        <p:cNvPr id="1" name=""/>
+        <p:cNvGrpSpPr/>
+        <p:nvPr/>
+      </p:nvGrpSpPr>
+      <p:grpSpPr>
+        <a:xfrm>
+          <a:off x="0" y="0"/>
+          <a:ext cx="0" cy="0"/>
+          <a:chOff x="0" y="0"/>
+          <a:chExt cx="0" cy="0"/>
+        </a:xfrm>
+      </p:grpSpPr>
+      <p:sp>
+        <p:nvSpPr>
+          <p:cNvPr id="2" name="Title 1">
+            <a:extLst>
+              <a:ext uri="{FF2B5EF4-FFF2-40B4-BE49-F238E27FC236}">
+                <a16:creationId xmlns:a16="http://schemas.microsoft.com/office/drawing/2014/main" id="{7E901C9F-B39A-4BC2-AF24-AC68F3EA9B0D}"/>
+              </a:ext>
+            </a:extLst>
+          </p:cNvPr>
+          <p:cNvSpPr>
+            <a:spLocks noGrp="1"/>
+          </p:cNvSpPr>
+          <p:nvPr>
+            <p:ph type="title"/>
+          </p:nvPr>
+        </p:nvSpPr>
+        <p:spPr/>
+        <p:txBody>
+          <a:bodyPr/>
+          <a:lstStyle/>
+          <a:p>
+            <a:pPr algn="ctr"/>
+            <a:r>
+              <a:rPr lang="en-US" dirty="0"/>
+              <a:t>Appending a linked list</a:t>
+            </a:r>
+          </a:p>
+        </p:txBody>
+      </p:sp>
+      <p:pic>
+        <p:nvPicPr>
+          <p:cNvPr id="5" name="Content Placeholder 4">
+            <a:extLst>
+              <a:ext uri="{FF2B5EF4-FFF2-40B4-BE49-F238E27FC236}">
+                <a16:creationId xmlns:a16="http://schemas.microsoft.com/office/drawing/2014/main" id="{B1E8DE35-21EC-4E31-8F68-577998B40104}"/>
+              </a:ext>
+            </a:extLst>
+          </p:cNvPr>
+          <p:cNvPicPr>
+            <a:picLocks noGrp="1" noChangeAspect="1"/>
+          </p:cNvPicPr>
+          <p:nvPr>
+            <p:ph idx="1"/>
+          </p:nvPr>
+        </p:nvPicPr>
+        <p:blipFill>
+          <a:blip r:embed="rId2"/>
+          <a:stretch>
+            <a:fillRect/>
+          </a:stretch>
+        </p:blipFill>
+        <p:spPr>
+          <a:xfrm>
+            <a:off x="313861" y="2668060"/>
+            <a:ext cx="11564278" cy="3671780"/>
+          </a:xfrm>
+        </p:spPr>
+      </p:pic>
+      <p:sp>
+        <p:nvSpPr>
+          <p:cNvPr id="6" name="Rectangle 5">
+            <a:extLst>
+              <a:ext uri="{FF2B5EF4-FFF2-40B4-BE49-F238E27FC236}">
+                <a16:creationId xmlns:a16="http://schemas.microsoft.com/office/drawing/2014/main" id="{0BCE457B-BA09-4249-B921-838D5F495A42}"/>
+              </a:ext>
+            </a:extLst>
+          </p:cNvPr>
+          <p:cNvSpPr/>
+          <p:nvPr/>
+        </p:nvSpPr>
+        <p:spPr>
+          <a:xfrm>
+            <a:off x="6032390" y="4314909"/>
+            <a:ext cx="2356237" cy="1057523"/>
+          </a:xfrm>
+          <a:prstGeom prst="rect">
+            <a:avLst/>
+          </a:prstGeom>
+          <a:solidFill>
+            <a:schemeClr val="tx1"/>
+          </a:solidFill>
+          <a:ln>
+            <a:solidFill>
+              <a:schemeClr val="tx1"/>
+            </a:solidFill>
+          </a:ln>
+        </p:spPr>
+        <p:style>
+          <a:lnRef idx="2">
+            <a:schemeClr val="accent1">
+              <a:shade val="50000"/>
+            </a:schemeClr>
+          </a:lnRef>
+          <a:fillRef idx="1">
+            <a:schemeClr val="accent1"/>
+          </a:fillRef>
+          <a:effectRef idx="0">
+            <a:schemeClr val="accent1"/>
+          </a:effectRef>
+          <a:fontRef idx="minor">
+            <a:schemeClr val="lt1"/>
+          </a:fontRef>
+        </p:style>
+        <p:txBody>
+          <a:bodyPr rtlCol="0" anchor="ctr"/>
+          <a:lstStyle/>
+          <a:p>
+            <a:pPr algn="ctr"/>
+            <a:endParaRPr lang="en-US"/>
+          </a:p>
+        </p:txBody>
+      </p:sp>
+      <p:sp>
+        <p:nvSpPr>
+          <p:cNvPr id="7" name="Rectangle 6">
+            <a:extLst>
+              <a:ext uri="{FF2B5EF4-FFF2-40B4-BE49-F238E27FC236}">
+                <a16:creationId xmlns:a16="http://schemas.microsoft.com/office/drawing/2014/main" id="{A8359F8D-8887-4DC5-96DA-FF3505775F86}"/>
+              </a:ext>
+            </a:extLst>
+          </p:cNvPr>
+          <p:cNvSpPr/>
+          <p:nvPr/>
+        </p:nvSpPr>
+        <p:spPr>
+          <a:xfrm>
+            <a:off x="5738949" y="3065417"/>
+            <a:ext cx="5895703" cy="3082834"/>
+          </a:xfrm>
+          <a:prstGeom prst="rect">
+            <a:avLst/>
+          </a:prstGeom>
+          <a:solidFill>
+            <a:schemeClr val="tx1"/>
+          </a:solidFill>
+          <a:ln>
+            <a:solidFill>
+              <a:schemeClr val="tx1"/>
+            </a:solidFill>
+          </a:ln>
+        </p:spPr>
+        <p:style>
+          <a:lnRef idx="2">
+            <a:schemeClr val="accent1">
+              <a:shade val="50000"/>
+            </a:schemeClr>
+          </a:lnRef>
+          <a:fillRef idx="1">
+            <a:schemeClr val="accent1"/>
+          </a:fillRef>
+          <a:effectRef idx="0">
+            <a:schemeClr val="accent1"/>
+          </a:effectRef>
+          <a:fontRef idx="minor">
+            <a:schemeClr val="lt1"/>
+          </a:fontRef>
+        </p:style>
+        <p:txBody>
+          <a:bodyPr rtlCol="0" anchor="ctr"/>
+          <a:lstStyle/>
+          <a:p>
+            <a:pPr algn="ctr"/>
+            <a:endParaRPr lang="en-US"/>
+          </a:p>
+        </p:txBody>
+      </p:sp>
+    </p:spTree>
+    <p:extLst>
+      <p:ext uri="{BB962C8B-B14F-4D97-AF65-F5344CB8AC3E}">
+        <p14:creationId xmlns:p14="http://schemas.microsoft.com/office/powerpoint/2010/main" val="4281198018"/>
+      </p:ext>
+    </p:extLst>
+  </p:cSld>
+  <p:clrMapOvr>
+    <a:masterClrMapping/>
+  </p:clrMapOvr>
+</p:sld>
+</file>
+
+<file path=ppt/slides/slide8.xml><?xml version="1.0" encoding="utf-8"?>
+<p:sld xmlns:a="http://schemas.openxmlformats.org/drawingml/2006/main" xmlns:r="http://schemas.openxmlformats.org/officeDocument/2006/relationships" xmlns:p="http://schemas.openxmlformats.org/presentationml/2006/main">
+  <p:cSld>
+    <p:spTree>
+      <p:nvGrpSpPr>
+        <p:cNvPr id="1" name=""/>
+        <p:cNvGrpSpPr/>
+        <p:nvPr/>
+      </p:nvGrpSpPr>
+      <p:grpSpPr>
+        <a:xfrm>
+          <a:off x="0" y="0"/>
+          <a:ext cx="0" cy="0"/>
+          <a:chOff x="0" y="0"/>
+          <a:chExt cx="0" cy="0"/>
+        </a:xfrm>
+      </p:grpSpPr>
+      <p:sp>
+        <p:nvSpPr>
+          <p:cNvPr id="2" name="Title 1">
+            <a:extLst>
+              <a:ext uri="{FF2B5EF4-FFF2-40B4-BE49-F238E27FC236}">
+                <a16:creationId xmlns:a16="http://schemas.microsoft.com/office/drawing/2014/main" id="{7E901C9F-B39A-4BC2-AF24-AC68F3EA9B0D}"/>
+              </a:ext>
+            </a:extLst>
+          </p:cNvPr>
+          <p:cNvSpPr>
+            <a:spLocks noGrp="1"/>
+          </p:cNvSpPr>
+          <p:nvPr>
+            <p:ph type="title"/>
+          </p:nvPr>
+        </p:nvSpPr>
+        <p:spPr/>
+        <p:txBody>
+          <a:bodyPr/>
+          <a:lstStyle/>
+          <a:p>
+            <a:pPr algn="ctr"/>
+            <a:r>
+              <a:rPr lang="en-US" dirty="0"/>
+              <a:t>Appending a linked list</a:t>
+            </a:r>
+          </a:p>
+        </p:txBody>
+      </p:sp>
+      <p:pic>
+        <p:nvPicPr>
+          <p:cNvPr id="5" name="Content Placeholder 4">
+            <a:extLst>
+              <a:ext uri="{FF2B5EF4-FFF2-40B4-BE49-F238E27FC236}">
+                <a16:creationId xmlns:a16="http://schemas.microsoft.com/office/drawing/2014/main" id="{B1E8DE35-21EC-4E31-8F68-577998B40104}"/>
+              </a:ext>
+            </a:extLst>
+          </p:cNvPr>
+          <p:cNvPicPr>
+            <a:picLocks noGrp="1" noChangeAspect="1"/>
+          </p:cNvPicPr>
+          <p:nvPr>
+            <p:ph idx="1"/>
+          </p:nvPr>
+        </p:nvPicPr>
+        <p:blipFill>
+          <a:blip r:embed="rId2"/>
+          <a:stretch>
+            <a:fillRect/>
+          </a:stretch>
+        </p:blipFill>
+        <p:spPr>
+          <a:xfrm>
+            <a:off x="313861" y="2668060"/>
+            <a:ext cx="11564278" cy="3671780"/>
+          </a:xfrm>
+        </p:spPr>
+      </p:pic>
+      <p:sp>
+        <p:nvSpPr>
+          <p:cNvPr id="6" name="Rectangle 5">
+            <a:extLst>
+              <a:ext uri="{FF2B5EF4-FFF2-40B4-BE49-F238E27FC236}">
+                <a16:creationId xmlns:a16="http://schemas.microsoft.com/office/drawing/2014/main" id="{0BCE457B-BA09-4249-B921-838D5F495A42}"/>
+              </a:ext>
+            </a:extLst>
+          </p:cNvPr>
+          <p:cNvSpPr/>
+          <p:nvPr/>
+        </p:nvSpPr>
+        <p:spPr>
+          <a:xfrm>
+            <a:off x="6032390" y="4314909"/>
+            <a:ext cx="2356237" cy="1057523"/>
+          </a:xfrm>
+          <a:prstGeom prst="rect">
+            <a:avLst/>
+          </a:prstGeom>
+          <a:solidFill>
+            <a:schemeClr val="tx1"/>
+          </a:solidFill>
+          <a:ln>
+            <a:solidFill>
+              <a:schemeClr val="tx1"/>
+            </a:solidFill>
+          </a:ln>
+        </p:spPr>
+        <p:style>
+          <a:lnRef idx="2">
+            <a:schemeClr val="accent1">
+              <a:shade val="50000"/>
+            </a:schemeClr>
+          </a:lnRef>
+          <a:fillRef idx="1">
+            <a:schemeClr val="accent1"/>
+          </a:fillRef>
+          <a:effectRef idx="0">
+            <a:schemeClr val="accent1"/>
+          </a:effectRef>
+          <a:fontRef idx="minor">
+            <a:schemeClr val="lt1"/>
+          </a:fontRef>
+        </p:style>
+        <p:txBody>
+          <a:bodyPr rtlCol="0" anchor="ctr"/>
+          <a:lstStyle/>
+          <a:p>
+            <a:pPr algn="ctr"/>
+            <a:endParaRPr lang="en-US"/>
+          </a:p>
+        </p:txBody>
+      </p:sp>
+      <p:sp>
+        <p:nvSpPr>
+          <p:cNvPr id="7" name="Rectangle 6">
+            <a:extLst>
+              <a:ext uri="{FF2B5EF4-FFF2-40B4-BE49-F238E27FC236}">
+                <a16:creationId xmlns:a16="http://schemas.microsoft.com/office/drawing/2014/main" id="{ABB1A193-BE5A-4369-AA1A-66DD1D23E088}"/>
+              </a:ext>
+            </a:extLst>
+          </p:cNvPr>
+          <p:cNvSpPr/>
+          <p:nvPr/>
+        </p:nvSpPr>
+        <p:spPr>
+          <a:xfrm>
+            <a:off x="7977051" y="3065417"/>
+            <a:ext cx="3657601" cy="3082834"/>
+          </a:xfrm>
+          <a:prstGeom prst="rect">
+            <a:avLst/>
+          </a:prstGeom>
+          <a:solidFill>
+            <a:schemeClr val="tx1"/>
+          </a:solidFill>
+          <a:ln>
+            <a:solidFill>
+              <a:schemeClr val="tx1"/>
+            </a:solidFill>
+          </a:ln>
+        </p:spPr>
+        <p:style>
+          <a:lnRef idx="2">
+            <a:schemeClr val="accent1">
+              <a:shade val="50000"/>
+            </a:schemeClr>
+          </a:lnRef>
+          <a:fillRef idx="1">
+            <a:schemeClr val="accent1"/>
+          </a:fillRef>
+          <a:effectRef idx="0">
+            <a:schemeClr val="accent1"/>
+          </a:effectRef>
+          <a:fontRef idx="minor">
+            <a:schemeClr val="lt1"/>
+          </a:fontRef>
+        </p:style>
+        <p:txBody>
+          <a:bodyPr rtlCol="0" anchor="ctr"/>
+          <a:lstStyle/>
+          <a:p>
+            <a:pPr algn="ctr"/>
+            <a:endParaRPr lang="en-US"/>
+          </a:p>
+        </p:txBody>
+      </p:sp>
+    </p:spTree>
+    <p:extLst>
+      <p:ext uri="{BB962C8B-B14F-4D97-AF65-F5344CB8AC3E}">
+        <p14:creationId xmlns:p14="http://schemas.microsoft.com/office/powerpoint/2010/main" val="2765965417"/>
+      </p:ext>
+    </p:extLst>
+  </p:cSld>
+  <p:clrMapOvr>
+    <a:masterClrMapping/>
+  </p:clrMapOvr>
+</p:sld>
+</file>
+
+<file path=ppt/slides/slide9.xml><?xml version="1.0" encoding="utf-8"?>
+<p:sld xmlns:a="http://schemas.openxmlformats.org/drawingml/2006/main" xmlns:r="http://schemas.openxmlformats.org/officeDocument/2006/relationships" xmlns:p="http://schemas.openxmlformats.org/presentationml/2006/main">
+  <p:cSld>
+    <p:spTree>
+      <p:nvGrpSpPr>
+        <p:cNvPr id="1" name=""/>
+        <p:cNvGrpSpPr/>
+        <p:nvPr/>
+      </p:nvGrpSpPr>
+      <p:grpSpPr>
+        <a:xfrm>
+          <a:off x="0" y="0"/>
+          <a:ext cx="0" cy="0"/>
+          <a:chOff x="0" y="0"/>
+          <a:chExt cx="0" cy="0"/>
+        </a:xfrm>
+      </p:grpSpPr>
+      <p:sp>
+        <p:nvSpPr>
+          <p:cNvPr id="2" name="Title 1">
+            <a:extLst>
+              <a:ext uri="{FF2B5EF4-FFF2-40B4-BE49-F238E27FC236}">
+                <a16:creationId xmlns:a16="http://schemas.microsoft.com/office/drawing/2014/main" id="{7E901C9F-B39A-4BC2-AF24-AC68F3EA9B0D}"/>
+              </a:ext>
+            </a:extLst>
+          </p:cNvPr>
+          <p:cNvSpPr>
+            <a:spLocks noGrp="1"/>
+          </p:cNvSpPr>
+          <p:nvPr>
+            <p:ph type="title"/>
+          </p:nvPr>
+        </p:nvSpPr>
+        <p:spPr/>
+        <p:txBody>
+          <a:bodyPr/>
+          <a:lstStyle/>
+          <a:p>
+            <a:pPr algn="ctr"/>
+            <a:r>
+              <a:rPr lang="en-US" dirty="0"/>
+              <a:t>Appending a linked list</a:t>
+            </a:r>
+          </a:p>
+        </p:txBody>
+      </p:sp>
+      <p:pic>
+        <p:nvPicPr>
+          <p:cNvPr id="5" name="Content Placeholder 4">
+            <a:extLst>
+              <a:ext uri="{FF2B5EF4-FFF2-40B4-BE49-F238E27FC236}">
+                <a16:creationId xmlns:a16="http://schemas.microsoft.com/office/drawing/2014/main" id="{B1E8DE35-21EC-4E31-8F68-577998B40104}"/>
+              </a:ext>
+            </a:extLst>
+          </p:cNvPr>
+          <p:cNvPicPr>
+            <a:picLocks noGrp="1" noChangeAspect="1"/>
+          </p:cNvPicPr>
+          <p:nvPr>
+            <p:ph idx="1"/>
+          </p:nvPr>
+        </p:nvPicPr>
+        <p:blipFill>
+          <a:blip r:embed="rId2"/>
+          <a:stretch>
+            <a:fillRect/>
+          </a:stretch>
+        </p:blipFill>
+        <p:spPr>
+          <a:xfrm>
+            <a:off x="313861" y="2668060"/>
+            <a:ext cx="11564278" cy="3671780"/>
+          </a:xfrm>
+        </p:spPr>
+      </p:pic>
+      <p:sp>
+        <p:nvSpPr>
+          <p:cNvPr id="6" name="Rectangle 5">
+            <a:extLst>
+              <a:ext uri="{FF2B5EF4-FFF2-40B4-BE49-F238E27FC236}">
+                <a16:creationId xmlns:a16="http://schemas.microsoft.com/office/drawing/2014/main" id="{0BCE457B-BA09-4249-B921-838D5F495A42}"/>
+              </a:ext>
+            </a:extLst>
+          </p:cNvPr>
+          <p:cNvSpPr/>
+          <p:nvPr/>
+        </p:nvSpPr>
+        <p:spPr>
+          <a:xfrm>
+            <a:off x="6032390" y="4314909"/>
+            <a:ext cx="2356237" cy="1057523"/>
+          </a:xfrm>
+          <a:prstGeom prst="rect">
+            <a:avLst/>
+          </a:prstGeom>
+          <a:solidFill>
+            <a:schemeClr val="tx1"/>
+          </a:solidFill>
+          <a:ln>
+            <a:solidFill>
+              <a:schemeClr val="tx1"/>
+            </a:solidFill>
+          </a:ln>
+        </p:spPr>
+        <p:style>
+          <a:lnRef idx="2">
+            <a:schemeClr val="accent1">
+              <a:shade val="50000"/>
+            </a:schemeClr>
+          </a:lnRef>
+          <a:fillRef idx="1">
+            <a:schemeClr val="accent1"/>
+          </a:fillRef>
+          <a:effectRef idx="0">
+            <a:schemeClr val="accent1"/>
+          </a:effectRef>
+          <a:fontRef idx="minor">
+            <a:schemeClr val="lt1"/>
+          </a:fontRef>
+        </p:style>
+        <p:txBody>
+          <a:bodyPr rtlCol="0" anchor="ctr"/>
+          <a:lstStyle/>
+          <a:p>
+            <a:pPr algn="ctr"/>
+            <a:endParaRPr lang="en-US"/>
+          </a:p>
+        </p:txBody>
+      </p:sp>
+    </p:spTree>
+    <p:extLst>
+      <p:ext uri="{BB962C8B-B14F-4D97-AF65-F5344CB8AC3E}">
+        <p14:creationId xmlns:p14="http://schemas.microsoft.com/office/powerpoint/2010/main" val="3769476501"/>
       </p:ext>
     </p:extLst>
   </p:cSld>

</xml_diff>